<commit_message>
Added scripts from Asger and updated presentation
</commit_message>
<xml_diff>
--- a/docs/CoalHMM.pptx
+++ b/docs/CoalHMM.pptx
@@ -980,7 +980,7 @@
           <a:bodyPr/>
           <a:lstStyle/>
           <a:p>
-            <a:endParaRPr lang="en-GB"/>
+            <a:endParaRPr lang="en-GB" dirty="0"/>
           </a:p>
         </p:txBody>
       </p:sp>
@@ -9607,6 +9607,3740 @@
           </a:p>
         </p:txBody>
       </p:sp>
+      <p:sp>
+        <p:nvSpPr>
+          <p:cNvPr id="2" name="Rectangle 1">
+            <a:extLst>
+              <a:ext uri="{FF2B5EF4-FFF2-40B4-BE49-F238E27FC236}">
+                <a16:creationId xmlns:a16="http://schemas.microsoft.com/office/drawing/2014/main" id="{CE30A589-D8D5-0243-B37E-7FBA343BC61B}"/>
+              </a:ext>
+            </a:extLst>
+          </p:cNvPr>
+          <p:cNvSpPr/>
+          <p:nvPr/>
+        </p:nvSpPr>
+        <p:spPr bwMode="auto">
+          <a:xfrm>
+            <a:off x="5751625" y="3428870"/>
+            <a:ext cx="684575" cy="684575"/>
+          </a:xfrm>
+          <a:prstGeom prst="rect">
+            <a:avLst/>
+          </a:prstGeom>
+          <a:noFill/>
+          <a:ln w="1778" cap="flat" cmpd="sng" algn="ctr">
+            <a:solidFill>
+              <a:schemeClr val="accent1"/>
+            </a:solidFill>
+            <a:prstDash val="solid"/>
+            <a:round/>
+            <a:headEnd type="none" w="med" len="med"/>
+            <a:tailEnd type="none" w="med" len="med"/>
+          </a:ln>
+          <a:effectLst/>
+        </p:spPr>
+        <p:txBody>
+          <a:bodyPr vert="horz" wrap="square" lIns="91440" tIns="45720" rIns="91440" bIns="45720" numCol="1" rtlCol="0" anchor="t" anchorCtr="0" compatLnSpc="1">
+            <a:prstTxWarp prst="textNoShape">
+              <a:avLst/>
+            </a:prstTxWarp>
+            <a:noAutofit/>
+          </a:bodyPr>
+          <a:lstStyle/>
+          <a:p>
+            <a:pPr marL="0" marR="0" indent="0" algn="l" defTabSz="914400" rtl="0" eaLnBrk="1" fontAlgn="base" latinLnBrk="0" hangingPunct="1">
+              <a:lnSpc>
+                <a:spcPct val="95000"/>
+              </a:lnSpc>
+              <a:spcBef>
+                <a:spcPct val="0"/>
+              </a:spcBef>
+              <a:spcAft>
+                <a:spcPct val="0"/>
+              </a:spcAft>
+              <a:buClrTx/>
+              <a:buSzTx/>
+              <a:buFont typeface="AU Passata" pitchFamily="34" charset="0"/>
+              <a:buNone/>
+              <a:tabLst/>
+            </a:pPr>
+            <a:endParaRPr kumimoji="0" lang="en-DK" sz="1600" b="0" i="0" u="none" strike="noStrike" cap="none" normalizeH="0" baseline="0" dirty="0" err="1">
+              <a:ln>
+                <a:noFill/>
+              </a:ln>
+              <a:solidFill>
+                <a:schemeClr val="bg1"/>
+              </a:solidFill>
+              <a:effectLst/>
+              <a:latin typeface="AU Passata" pitchFamily="34" charset="0"/>
+            </a:endParaRPr>
+          </a:p>
+        </p:txBody>
+      </p:sp>
+      <p:sp>
+        <p:nvSpPr>
+          <p:cNvPr id="6" name="Rectangle 5">
+            <a:extLst>
+              <a:ext uri="{FF2B5EF4-FFF2-40B4-BE49-F238E27FC236}">
+                <a16:creationId xmlns:a16="http://schemas.microsoft.com/office/drawing/2014/main" id="{78910790-C0E1-EC41-89B5-E006F5F82ED6}"/>
+              </a:ext>
+            </a:extLst>
+          </p:cNvPr>
+          <p:cNvSpPr/>
+          <p:nvPr/>
+        </p:nvSpPr>
+        <p:spPr bwMode="auto">
+          <a:xfrm>
+            <a:off x="5751625" y="2528770"/>
+            <a:ext cx="684575" cy="684575"/>
+          </a:xfrm>
+          <a:prstGeom prst="rect">
+            <a:avLst/>
+          </a:prstGeom>
+          <a:noFill/>
+          <a:ln w="1778" cap="flat" cmpd="sng" algn="ctr">
+            <a:solidFill>
+              <a:schemeClr val="accent1"/>
+            </a:solidFill>
+            <a:prstDash val="solid"/>
+            <a:round/>
+            <a:headEnd type="none" w="med" len="med"/>
+            <a:tailEnd type="none" w="med" len="med"/>
+          </a:ln>
+          <a:effectLst/>
+        </p:spPr>
+        <p:txBody>
+          <a:bodyPr vert="horz" wrap="square" lIns="91440" tIns="45720" rIns="91440" bIns="45720" numCol="1" rtlCol="0" anchor="t" anchorCtr="0" compatLnSpc="1">
+            <a:prstTxWarp prst="textNoShape">
+              <a:avLst/>
+            </a:prstTxWarp>
+            <a:noAutofit/>
+          </a:bodyPr>
+          <a:lstStyle/>
+          <a:p>
+            <a:pPr marL="0" marR="0" indent="0" algn="l" defTabSz="914400" rtl="0" eaLnBrk="1" fontAlgn="base" latinLnBrk="0" hangingPunct="1">
+              <a:lnSpc>
+                <a:spcPct val="95000"/>
+              </a:lnSpc>
+              <a:spcBef>
+                <a:spcPct val="0"/>
+              </a:spcBef>
+              <a:spcAft>
+                <a:spcPct val="0"/>
+              </a:spcAft>
+              <a:buClrTx/>
+              <a:buSzTx/>
+              <a:buFont typeface="AU Passata" pitchFamily="34" charset="0"/>
+              <a:buNone/>
+              <a:tabLst/>
+            </a:pPr>
+            <a:endParaRPr kumimoji="0" lang="en-DK" sz="1600" b="0" i="0" u="none" strike="noStrike" cap="none" normalizeH="0" baseline="0" dirty="0" err="1">
+              <a:ln>
+                <a:noFill/>
+              </a:ln>
+              <a:solidFill>
+                <a:schemeClr val="bg1"/>
+              </a:solidFill>
+              <a:effectLst/>
+              <a:latin typeface="AU Passata" pitchFamily="34" charset="0"/>
+            </a:endParaRPr>
+          </a:p>
+        </p:txBody>
+      </p:sp>
+      <p:sp>
+        <p:nvSpPr>
+          <p:cNvPr id="7" name="Rectangle 6">
+            <a:extLst>
+              <a:ext uri="{FF2B5EF4-FFF2-40B4-BE49-F238E27FC236}">
+                <a16:creationId xmlns:a16="http://schemas.microsoft.com/office/drawing/2014/main" id="{B3E803CE-ADC5-FA46-8842-53682F80AA1D}"/>
+              </a:ext>
+            </a:extLst>
+          </p:cNvPr>
+          <p:cNvSpPr/>
+          <p:nvPr/>
+        </p:nvSpPr>
+        <p:spPr bwMode="auto">
+          <a:xfrm>
+            <a:off x="5751625" y="1628800"/>
+            <a:ext cx="684575" cy="684575"/>
+          </a:xfrm>
+          <a:prstGeom prst="rect">
+            <a:avLst/>
+          </a:prstGeom>
+          <a:noFill/>
+          <a:ln w="1778" cap="flat" cmpd="sng" algn="ctr">
+            <a:solidFill>
+              <a:schemeClr val="accent1"/>
+            </a:solidFill>
+            <a:prstDash val="solid"/>
+            <a:round/>
+            <a:headEnd type="none" w="med" len="med"/>
+            <a:tailEnd type="none" w="med" len="med"/>
+          </a:ln>
+          <a:effectLst/>
+        </p:spPr>
+        <p:txBody>
+          <a:bodyPr vert="horz" wrap="square" lIns="91440" tIns="45720" rIns="91440" bIns="45720" numCol="1" rtlCol="0" anchor="t" anchorCtr="0" compatLnSpc="1">
+            <a:prstTxWarp prst="textNoShape">
+              <a:avLst/>
+            </a:prstTxWarp>
+            <a:noAutofit/>
+          </a:bodyPr>
+          <a:lstStyle/>
+          <a:p>
+            <a:pPr marL="0" marR="0" indent="0" algn="l" defTabSz="914400" rtl="0" eaLnBrk="1" fontAlgn="base" latinLnBrk="0" hangingPunct="1">
+              <a:lnSpc>
+                <a:spcPct val="95000"/>
+              </a:lnSpc>
+              <a:spcBef>
+                <a:spcPct val="0"/>
+              </a:spcBef>
+              <a:spcAft>
+                <a:spcPct val="0"/>
+              </a:spcAft>
+              <a:buClrTx/>
+              <a:buSzTx/>
+              <a:buFont typeface="AU Passata" pitchFamily="34" charset="0"/>
+              <a:buNone/>
+              <a:tabLst/>
+            </a:pPr>
+            <a:endParaRPr kumimoji="0" lang="en-DK" sz="1600" b="0" i="0" u="none" strike="noStrike" cap="none" normalizeH="0" baseline="0" dirty="0" err="1">
+              <a:ln>
+                <a:noFill/>
+              </a:ln>
+              <a:solidFill>
+                <a:schemeClr val="bg1"/>
+              </a:solidFill>
+              <a:effectLst/>
+              <a:latin typeface="AU Passata" pitchFamily="34" charset="0"/>
+            </a:endParaRPr>
+          </a:p>
+        </p:txBody>
+      </p:sp>
+      <p:sp>
+        <p:nvSpPr>
+          <p:cNvPr id="8" name="Rectangle 7">
+            <a:extLst>
+              <a:ext uri="{FF2B5EF4-FFF2-40B4-BE49-F238E27FC236}">
+                <a16:creationId xmlns:a16="http://schemas.microsoft.com/office/drawing/2014/main" id="{0EF457BB-91EF-0B45-83F6-FD284A03211B}"/>
+              </a:ext>
+            </a:extLst>
+          </p:cNvPr>
+          <p:cNvSpPr/>
+          <p:nvPr/>
+        </p:nvSpPr>
+        <p:spPr bwMode="auto">
+          <a:xfrm>
+            <a:off x="5751625" y="4328970"/>
+            <a:ext cx="684575" cy="684575"/>
+          </a:xfrm>
+          <a:prstGeom prst="rect">
+            <a:avLst/>
+          </a:prstGeom>
+          <a:noFill/>
+          <a:ln w="1778" cap="flat" cmpd="sng" algn="ctr">
+            <a:solidFill>
+              <a:schemeClr val="accent1"/>
+            </a:solidFill>
+            <a:prstDash val="solid"/>
+            <a:round/>
+            <a:headEnd type="none" w="med" len="med"/>
+            <a:tailEnd type="none" w="med" len="med"/>
+          </a:ln>
+          <a:effectLst/>
+        </p:spPr>
+        <p:txBody>
+          <a:bodyPr vert="horz" wrap="square" lIns="91440" tIns="45720" rIns="91440" bIns="45720" numCol="1" rtlCol="0" anchor="t" anchorCtr="0" compatLnSpc="1">
+            <a:prstTxWarp prst="textNoShape">
+              <a:avLst/>
+            </a:prstTxWarp>
+            <a:noAutofit/>
+          </a:bodyPr>
+          <a:lstStyle/>
+          <a:p>
+            <a:pPr marL="0" marR="0" indent="0" algn="l" defTabSz="914400" rtl="0" eaLnBrk="1" fontAlgn="base" latinLnBrk="0" hangingPunct="1">
+              <a:lnSpc>
+                <a:spcPct val="95000"/>
+              </a:lnSpc>
+              <a:spcBef>
+                <a:spcPct val="0"/>
+              </a:spcBef>
+              <a:spcAft>
+                <a:spcPct val="0"/>
+              </a:spcAft>
+              <a:buClrTx/>
+              <a:buSzTx/>
+              <a:buFont typeface="AU Passata" pitchFamily="34" charset="0"/>
+              <a:buNone/>
+              <a:tabLst/>
+            </a:pPr>
+            <a:endParaRPr kumimoji="0" lang="en-DK" sz="1600" b="0" i="0" u="none" strike="noStrike" cap="none" normalizeH="0" baseline="0" dirty="0" err="1">
+              <a:ln>
+                <a:noFill/>
+              </a:ln>
+              <a:solidFill>
+                <a:schemeClr val="bg1"/>
+              </a:solidFill>
+              <a:effectLst/>
+              <a:latin typeface="AU Passata" pitchFamily="34" charset="0"/>
+            </a:endParaRPr>
+          </a:p>
+        </p:txBody>
+      </p:sp>
+      <p:sp>
+        <p:nvSpPr>
+          <p:cNvPr id="9" name="Rectangle 8">
+            <a:extLst>
+              <a:ext uri="{FF2B5EF4-FFF2-40B4-BE49-F238E27FC236}">
+                <a16:creationId xmlns:a16="http://schemas.microsoft.com/office/drawing/2014/main" id="{B3CF498E-D31F-0D4C-B5DE-752868642D6C}"/>
+              </a:ext>
+            </a:extLst>
+          </p:cNvPr>
+          <p:cNvSpPr/>
+          <p:nvPr/>
+        </p:nvSpPr>
+        <p:spPr bwMode="auto">
+          <a:xfrm>
+            <a:off x="5748333" y="5229070"/>
+            <a:ext cx="684575" cy="684575"/>
+          </a:xfrm>
+          <a:prstGeom prst="rect">
+            <a:avLst/>
+          </a:prstGeom>
+          <a:noFill/>
+          <a:ln w="1778" cap="flat" cmpd="sng" algn="ctr">
+            <a:solidFill>
+              <a:schemeClr val="accent1"/>
+            </a:solidFill>
+            <a:prstDash val="solid"/>
+            <a:round/>
+            <a:headEnd type="none" w="med" len="med"/>
+            <a:tailEnd type="none" w="med" len="med"/>
+          </a:ln>
+          <a:effectLst/>
+        </p:spPr>
+        <p:txBody>
+          <a:bodyPr vert="horz" wrap="square" lIns="91440" tIns="45720" rIns="91440" bIns="45720" numCol="1" rtlCol="0" anchor="t" anchorCtr="0" compatLnSpc="1">
+            <a:prstTxWarp prst="textNoShape">
+              <a:avLst/>
+            </a:prstTxWarp>
+            <a:noAutofit/>
+          </a:bodyPr>
+          <a:lstStyle/>
+          <a:p>
+            <a:pPr marL="0" marR="0" indent="0" algn="l" defTabSz="914400" rtl="0" eaLnBrk="1" fontAlgn="base" latinLnBrk="0" hangingPunct="1">
+              <a:lnSpc>
+                <a:spcPct val="95000"/>
+              </a:lnSpc>
+              <a:spcBef>
+                <a:spcPct val="0"/>
+              </a:spcBef>
+              <a:spcAft>
+                <a:spcPct val="0"/>
+              </a:spcAft>
+              <a:buClrTx/>
+              <a:buSzTx/>
+              <a:buFont typeface="AU Passata" pitchFamily="34" charset="0"/>
+              <a:buNone/>
+              <a:tabLst/>
+            </a:pPr>
+            <a:endParaRPr kumimoji="0" lang="en-DK" sz="1600" b="0" i="0" u="none" strike="noStrike" cap="none" normalizeH="0" baseline="0" dirty="0" err="1">
+              <a:ln>
+                <a:noFill/>
+              </a:ln>
+              <a:solidFill>
+                <a:schemeClr val="bg1"/>
+              </a:solidFill>
+              <a:effectLst/>
+              <a:latin typeface="AU Passata" pitchFamily="34" charset="0"/>
+            </a:endParaRPr>
+          </a:p>
+        </p:txBody>
+      </p:sp>
+      <p:sp>
+        <p:nvSpPr>
+          <p:cNvPr id="10" name="Rectangle 9">
+            <a:extLst>
+              <a:ext uri="{FF2B5EF4-FFF2-40B4-BE49-F238E27FC236}">
+                <a16:creationId xmlns:a16="http://schemas.microsoft.com/office/drawing/2014/main" id="{30DBC50E-C4BA-4E4C-8B78-CF96150822AF}"/>
+              </a:ext>
+            </a:extLst>
+          </p:cNvPr>
+          <p:cNvSpPr/>
+          <p:nvPr/>
+        </p:nvSpPr>
+        <p:spPr bwMode="auto">
+          <a:xfrm>
+            <a:off x="6684415" y="3428869"/>
+            <a:ext cx="684575" cy="684575"/>
+          </a:xfrm>
+          <a:prstGeom prst="rect">
+            <a:avLst/>
+          </a:prstGeom>
+          <a:noFill/>
+          <a:ln w="1778" cap="flat" cmpd="sng" algn="ctr">
+            <a:solidFill>
+              <a:schemeClr val="accent1"/>
+            </a:solidFill>
+            <a:prstDash val="solid"/>
+            <a:round/>
+            <a:headEnd type="none" w="med" len="med"/>
+            <a:tailEnd type="none" w="med" len="med"/>
+          </a:ln>
+          <a:effectLst/>
+        </p:spPr>
+        <p:txBody>
+          <a:bodyPr vert="horz" wrap="square" lIns="91440" tIns="45720" rIns="91440" bIns="45720" numCol="1" rtlCol="0" anchor="t" anchorCtr="0" compatLnSpc="1">
+            <a:prstTxWarp prst="textNoShape">
+              <a:avLst/>
+            </a:prstTxWarp>
+            <a:noAutofit/>
+          </a:bodyPr>
+          <a:lstStyle/>
+          <a:p>
+            <a:pPr marL="0" marR="0" indent="0" algn="l" defTabSz="914400" rtl="0" eaLnBrk="1" fontAlgn="base" latinLnBrk="0" hangingPunct="1">
+              <a:lnSpc>
+                <a:spcPct val="95000"/>
+              </a:lnSpc>
+              <a:spcBef>
+                <a:spcPct val="0"/>
+              </a:spcBef>
+              <a:spcAft>
+                <a:spcPct val="0"/>
+              </a:spcAft>
+              <a:buClrTx/>
+              <a:buSzTx/>
+              <a:buFont typeface="AU Passata" pitchFamily="34" charset="0"/>
+              <a:buNone/>
+              <a:tabLst/>
+            </a:pPr>
+            <a:endParaRPr kumimoji="0" lang="en-DK" sz="1600" b="0" i="0" u="none" strike="noStrike" cap="none" normalizeH="0" baseline="0" dirty="0" err="1">
+              <a:ln>
+                <a:noFill/>
+              </a:ln>
+              <a:solidFill>
+                <a:schemeClr val="bg1"/>
+              </a:solidFill>
+              <a:effectLst/>
+              <a:latin typeface="AU Passata" pitchFamily="34" charset="0"/>
+            </a:endParaRPr>
+          </a:p>
+        </p:txBody>
+      </p:sp>
+      <p:sp>
+        <p:nvSpPr>
+          <p:cNvPr id="11" name="Rectangle 10">
+            <a:extLst>
+              <a:ext uri="{FF2B5EF4-FFF2-40B4-BE49-F238E27FC236}">
+                <a16:creationId xmlns:a16="http://schemas.microsoft.com/office/drawing/2014/main" id="{D96293F7-0C89-F743-BE6B-125DD341EA6D}"/>
+              </a:ext>
+            </a:extLst>
+          </p:cNvPr>
+          <p:cNvSpPr/>
+          <p:nvPr/>
+        </p:nvSpPr>
+        <p:spPr bwMode="auto">
+          <a:xfrm>
+            <a:off x="7617205" y="3428869"/>
+            <a:ext cx="684575" cy="684575"/>
+          </a:xfrm>
+          <a:prstGeom prst="rect">
+            <a:avLst/>
+          </a:prstGeom>
+          <a:noFill/>
+          <a:ln w="1778" cap="flat" cmpd="sng" algn="ctr">
+            <a:solidFill>
+              <a:schemeClr val="accent1"/>
+            </a:solidFill>
+            <a:prstDash val="solid"/>
+            <a:round/>
+            <a:headEnd type="none" w="med" len="med"/>
+            <a:tailEnd type="none" w="med" len="med"/>
+          </a:ln>
+          <a:effectLst/>
+        </p:spPr>
+        <p:txBody>
+          <a:bodyPr vert="horz" wrap="square" lIns="91440" tIns="45720" rIns="91440" bIns="45720" numCol="1" rtlCol="0" anchor="t" anchorCtr="0" compatLnSpc="1">
+            <a:prstTxWarp prst="textNoShape">
+              <a:avLst/>
+            </a:prstTxWarp>
+            <a:noAutofit/>
+          </a:bodyPr>
+          <a:lstStyle/>
+          <a:p>
+            <a:pPr marL="0" marR="0" indent="0" algn="l" defTabSz="914400" rtl="0" eaLnBrk="1" fontAlgn="base" latinLnBrk="0" hangingPunct="1">
+              <a:lnSpc>
+                <a:spcPct val="95000"/>
+              </a:lnSpc>
+              <a:spcBef>
+                <a:spcPct val="0"/>
+              </a:spcBef>
+              <a:spcAft>
+                <a:spcPct val="0"/>
+              </a:spcAft>
+              <a:buClrTx/>
+              <a:buSzTx/>
+              <a:buFont typeface="AU Passata" pitchFamily="34" charset="0"/>
+              <a:buNone/>
+              <a:tabLst/>
+            </a:pPr>
+            <a:endParaRPr kumimoji="0" lang="en-DK" sz="1600" b="0" i="0" u="none" strike="noStrike" cap="none" normalizeH="0" baseline="0" dirty="0" err="1">
+              <a:ln>
+                <a:noFill/>
+              </a:ln>
+              <a:solidFill>
+                <a:schemeClr val="bg1"/>
+              </a:solidFill>
+              <a:effectLst/>
+              <a:latin typeface="AU Passata" pitchFamily="34" charset="0"/>
+            </a:endParaRPr>
+          </a:p>
+        </p:txBody>
+      </p:sp>
+      <p:sp>
+        <p:nvSpPr>
+          <p:cNvPr id="32" name="Oval 31">
+            <a:extLst>
+              <a:ext uri="{FF2B5EF4-FFF2-40B4-BE49-F238E27FC236}">
+                <a16:creationId xmlns:a16="http://schemas.microsoft.com/office/drawing/2014/main" id="{0DBC5CD6-1E85-7141-B769-3FAB19B0DF59}"/>
+              </a:ext>
+            </a:extLst>
+          </p:cNvPr>
+          <p:cNvSpPr/>
+          <p:nvPr/>
+        </p:nvSpPr>
+        <p:spPr bwMode="auto">
+          <a:xfrm flipH="1" flipV="1">
+            <a:off x="5900224" y="3631410"/>
+            <a:ext cx="63340" cy="63340"/>
+          </a:xfrm>
+          <a:prstGeom prst="ellipse">
+            <a:avLst/>
+          </a:prstGeom>
+          <a:solidFill>
+            <a:schemeClr val="tx1"/>
+          </a:solidFill>
+          <a:ln w="1778" cap="flat" cmpd="sng" algn="ctr">
+            <a:solidFill>
+              <a:schemeClr val="accent1"/>
+            </a:solidFill>
+            <a:prstDash val="solid"/>
+            <a:round/>
+            <a:headEnd type="none" w="med" len="med"/>
+            <a:tailEnd type="none" w="med" len="med"/>
+          </a:ln>
+          <a:effectLst/>
+        </p:spPr>
+        <p:txBody>
+          <a:bodyPr vert="horz" wrap="square" lIns="91440" tIns="45720" rIns="91440" bIns="45720" numCol="1" rtlCol="0" anchor="t" anchorCtr="0" compatLnSpc="1">
+            <a:prstTxWarp prst="textNoShape">
+              <a:avLst/>
+            </a:prstTxWarp>
+            <a:noAutofit/>
+          </a:bodyPr>
+          <a:lstStyle/>
+          <a:p>
+            <a:pPr marL="0" marR="0" indent="0" algn="l" defTabSz="914400" rtl="0" eaLnBrk="1" fontAlgn="base" latinLnBrk="0" hangingPunct="1">
+              <a:lnSpc>
+                <a:spcPct val="95000"/>
+              </a:lnSpc>
+              <a:spcBef>
+                <a:spcPct val="0"/>
+              </a:spcBef>
+              <a:spcAft>
+                <a:spcPct val="0"/>
+              </a:spcAft>
+              <a:buClrTx/>
+              <a:buSzTx/>
+              <a:buFont typeface="AU Passata" pitchFamily="34" charset="0"/>
+              <a:buNone/>
+              <a:tabLst/>
+            </a:pPr>
+            <a:endParaRPr kumimoji="0" lang="en-DK" sz="1600" b="0" i="0" u="none" strike="noStrike" cap="none" normalizeH="0" baseline="0" dirty="0" err="1">
+              <a:ln>
+                <a:noFill/>
+              </a:ln>
+              <a:solidFill>
+                <a:schemeClr val="bg1"/>
+              </a:solidFill>
+              <a:effectLst/>
+              <a:latin typeface="AU Passata" pitchFamily="34" charset="0"/>
+            </a:endParaRPr>
+          </a:p>
+        </p:txBody>
+      </p:sp>
+      <p:cxnSp>
+        <p:nvCxnSpPr>
+          <p:cNvPr id="33" name="Straight Connector 32">
+            <a:extLst>
+              <a:ext uri="{FF2B5EF4-FFF2-40B4-BE49-F238E27FC236}">
+                <a16:creationId xmlns:a16="http://schemas.microsoft.com/office/drawing/2014/main" id="{A542A948-2662-134D-B873-953D6B8C191C}"/>
+              </a:ext>
+            </a:extLst>
+          </p:cNvPr>
+          <p:cNvCxnSpPr>
+            <a:cxnSpLocks/>
+            <a:stCxn id="32" idx="6"/>
+          </p:cNvCxnSpPr>
+          <p:nvPr/>
+        </p:nvCxnSpPr>
+        <p:spPr bwMode="auto">
+          <a:xfrm>
+            <a:off x="5900224" y="3663080"/>
+            <a:ext cx="193655" cy="0"/>
+          </a:xfrm>
+          <a:prstGeom prst="line">
+            <a:avLst/>
+          </a:prstGeom>
+          <a:solidFill>
+            <a:schemeClr val="accent2"/>
+          </a:solidFill>
+          <a:ln w="19050" cap="flat" cmpd="sng" algn="ctr">
+            <a:solidFill>
+              <a:schemeClr val="accent1"/>
+            </a:solidFill>
+            <a:prstDash val="solid"/>
+            <a:round/>
+            <a:headEnd type="none" w="med" len="med"/>
+            <a:tailEnd type="none" w="med" len="med"/>
+          </a:ln>
+          <a:effectLst/>
+        </p:spPr>
+      </p:cxnSp>
+      <p:sp>
+        <p:nvSpPr>
+          <p:cNvPr id="35" name="Oval 34">
+            <a:extLst>
+              <a:ext uri="{FF2B5EF4-FFF2-40B4-BE49-F238E27FC236}">
+                <a16:creationId xmlns:a16="http://schemas.microsoft.com/office/drawing/2014/main" id="{EE070934-4D0F-444E-9BAD-E8AF3146BB84}"/>
+              </a:ext>
+            </a:extLst>
+          </p:cNvPr>
+          <p:cNvSpPr/>
+          <p:nvPr/>
+        </p:nvSpPr>
+        <p:spPr bwMode="auto">
+          <a:xfrm rot="10800000" flipH="1" flipV="1">
+            <a:off x="6224260" y="3631410"/>
+            <a:ext cx="63340" cy="63340"/>
+          </a:xfrm>
+          <a:prstGeom prst="ellipse">
+            <a:avLst/>
+          </a:prstGeom>
+          <a:solidFill>
+            <a:schemeClr val="tx1"/>
+          </a:solidFill>
+          <a:ln w="1778" cap="flat" cmpd="sng" algn="ctr">
+            <a:solidFill>
+              <a:schemeClr val="accent1"/>
+            </a:solidFill>
+            <a:prstDash val="solid"/>
+            <a:round/>
+            <a:headEnd type="none" w="med" len="med"/>
+            <a:tailEnd type="none" w="med" len="med"/>
+          </a:ln>
+          <a:effectLst/>
+        </p:spPr>
+        <p:txBody>
+          <a:bodyPr vert="horz" wrap="square" lIns="91440" tIns="45720" rIns="91440" bIns="45720" numCol="1" rtlCol="0" anchor="t" anchorCtr="0" compatLnSpc="1">
+            <a:prstTxWarp prst="textNoShape">
+              <a:avLst/>
+            </a:prstTxWarp>
+            <a:noAutofit/>
+          </a:bodyPr>
+          <a:lstStyle/>
+          <a:p>
+            <a:pPr marL="0" marR="0" indent="0" algn="l" defTabSz="914400" rtl="0" eaLnBrk="1" fontAlgn="base" latinLnBrk="0" hangingPunct="1">
+              <a:lnSpc>
+                <a:spcPct val="95000"/>
+              </a:lnSpc>
+              <a:spcBef>
+                <a:spcPct val="0"/>
+              </a:spcBef>
+              <a:spcAft>
+                <a:spcPct val="0"/>
+              </a:spcAft>
+              <a:buClrTx/>
+              <a:buSzTx/>
+              <a:buFont typeface="AU Passata" pitchFamily="34" charset="0"/>
+              <a:buNone/>
+              <a:tabLst/>
+            </a:pPr>
+            <a:endParaRPr kumimoji="0" lang="en-DK" sz="1600" b="0" i="0" u="none" strike="noStrike" cap="none" normalizeH="0" baseline="0" dirty="0" err="1">
+              <a:ln>
+                <a:noFill/>
+              </a:ln>
+              <a:solidFill>
+                <a:schemeClr val="bg1"/>
+              </a:solidFill>
+              <a:effectLst/>
+              <a:latin typeface="AU Passata" pitchFamily="34" charset="0"/>
+            </a:endParaRPr>
+          </a:p>
+        </p:txBody>
+      </p:sp>
+      <p:cxnSp>
+        <p:nvCxnSpPr>
+          <p:cNvPr id="36" name="Straight Connector 35">
+            <a:extLst>
+              <a:ext uri="{FF2B5EF4-FFF2-40B4-BE49-F238E27FC236}">
+                <a16:creationId xmlns:a16="http://schemas.microsoft.com/office/drawing/2014/main" id="{4D1DF8CA-5992-E540-B27E-0EE339D4004E}"/>
+              </a:ext>
+            </a:extLst>
+          </p:cNvPr>
+          <p:cNvCxnSpPr>
+            <a:cxnSpLocks/>
+            <a:stCxn id="35" idx="6"/>
+          </p:cNvCxnSpPr>
+          <p:nvPr/>
+        </p:nvCxnSpPr>
+        <p:spPr bwMode="auto">
+          <a:xfrm flipH="1">
+            <a:off x="6093946" y="3663080"/>
+            <a:ext cx="193654" cy="0"/>
+          </a:xfrm>
+          <a:prstGeom prst="line">
+            <a:avLst/>
+          </a:prstGeom>
+          <a:solidFill>
+            <a:schemeClr val="accent2"/>
+          </a:solidFill>
+          <a:ln w="19050" cap="flat" cmpd="sng" algn="ctr">
+            <a:solidFill>
+              <a:schemeClr val="accent1"/>
+            </a:solidFill>
+            <a:prstDash val="solid"/>
+            <a:round/>
+            <a:headEnd type="none" w="med" len="med"/>
+            <a:tailEnd type="none" w="med" len="med"/>
+          </a:ln>
+          <a:effectLst/>
+        </p:spPr>
+      </p:cxnSp>
+      <p:sp>
+        <p:nvSpPr>
+          <p:cNvPr id="43" name="Oval 42">
+            <a:extLst>
+              <a:ext uri="{FF2B5EF4-FFF2-40B4-BE49-F238E27FC236}">
+                <a16:creationId xmlns:a16="http://schemas.microsoft.com/office/drawing/2014/main" id="{1D544D54-9775-AE4B-B857-2F76B8433DFB}"/>
+              </a:ext>
+            </a:extLst>
+          </p:cNvPr>
+          <p:cNvSpPr/>
+          <p:nvPr/>
+        </p:nvSpPr>
+        <p:spPr bwMode="auto">
+          <a:xfrm flipH="1" flipV="1">
+            <a:off x="5900224" y="3873933"/>
+            <a:ext cx="63340" cy="63340"/>
+          </a:xfrm>
+          <a:prstGeom prst="ellipse">
+            <a:avLst/>
+          </a:prstGeom>
+          <a:solidFill>
+            <a:schemeClr val="tx1"/>
+          </a:solidFill>
+          <a:ln w="1778" cap="flat" cmpd="sng" algn="ctr">
+            <a:solidFill>
+              <a:schemeClr val="accent1"/>
+            </a:solidFill>
+            <a:prstDash val="solid"/>
+            <a:round/>
+            <a:headEnd type="none" w="med" len="med"/>
+            <a:tailEnd type="none" w="med" len="med"/>
+          </a:ln>
+          <a:effectLst/>
+        </p:spPr>
+        <p:txBody>
+          <a:bodyPr vert="horz" wrap="square" lIns="91440" tIns="45720" rIns="91440" bIns="45720" numCol="1" rtlCol="0" anchor="t" anchorCtr="0" compatLnSpc="1">
+            <a:prstTxWarp prst="textNoShape">
+              <a:avLst/>
+            </a:prstTxWarp>
+            <a:noAutofit/>
+          </a:bodyPr>
+          <a:lstStyle/>
+          <a:p>
+            <a:pPr marL="0" marR="0" indent="0" algn="l" defTabSz="914400" rtl="0" eaLnBrk="1" fontAlgn="base" latinLnBrk="0" hangingPunct="1">
+              <a:lnSpc>
+                <a:spcPct val="95000"/>
+              </a:lnSpc>
+              <a:spcBef>
+                <a:spcPct val="0"/>
+              </a:spcBef>
+              <a:spcAft>
+                <a:spcPct val="0"/>
+              </a:spcAft>
+              <a:buClrTx/>
+              <a:buSzTx/>
+              <a:buFont typeface="AU Passata" pitchFamily="34" charset="0"/>
+              <a:buNone/>
+              <a:tabLst/>
+            </a:pPr>
+            <a:endParaRPr kumimoji="0" lang="en-DK" sz="1600" b="0" i="0" u="none" strike="noStrike" cap="none" normalizeH="0" baseline="0" dirty="0" err="1">
+              <a:ln>
+                <a:noFill/>
+              </a:ln>
+              <a:solidFill>
+                <a:schemeClr val="bg1"/>
+              </a:solidFill>
+              <a:effectLst/>
+              <a:latin typeface="AU Passata" pitchFamily="34" charset="0"/>
+            </a:endParaRPr>
+          </a:p>
+        </p:txBody>
+      </p:sp>
+      <p:cxnSp>
+        <p:nvCxnSpPr>
+          <p:cNvPr id="44" name="Straight Connector 43">
+            <a:extLst>
+              <a:ext uri="{FF2B5EF4-FFF2-40B4-BE49-F238E27FC236}">
+                <a16:creationId xmlns:a16="http://schemas.microsoft.com/office/drawing/2014/main" id="{3AD2B1DA-B17F-764B-A7F0-FDF146942CB1}"/>
+              </a:ext>
+            </a:extLst>
+          </p:cNvPr>
+          <p:cNvCxnSpPr>
+            <a:cxnSpLocks/>
+            <a:stCxn id="43" idx="6"/>
+          </p:cNvCxnSpPr>
+          <p:nvPr/>
+        </p:nvCxnSpPr>
+        <p:spPr bwMode="auto">
+          <a:xfrm>
+            <a:off x="5900224" y="3905603"/>
+            <a:ext cx="193655" cy="0"/>
+          </a:xfrm>
+          <a:prstGeom prst="line">
+            <a:avLst/>
+          </a:prstGeom>
+          <a:solidFill>
+            <a:schemeClr val="accent2"/>
+          </a:solidFill>
+          <a:ln w="19050" cap="flat" cmpd="sng" algn="ctr">
+            <a:solidFill>
+              <a:schemeClr val="accent1"/>
+            </a:solidFill>
+            <a:prstDash val="solid"/>
+            <a:round/>
+            <a:headEnd type="none" w="med" len="med"/>
+            <a:tailEnd type="none" w="med" len="med"/>
+          </a:ln>
+          <a:effectLst/>
+        </p:spPr>
+      </p:cxnSp>
+      <p:sp>
+        <p:nvSpPr>
+          <p:cNvPr id="41" name="Oval 40">
+            <a:extLst>
+              <a:ext uri="{FF2B5EF4-FFF2-40B4-BE49-F238E27FC236}">
+                <a16:creationId xmlns:a16="http://schemas.microsoft.com/office/drawing/2014/main" id="{6480ECF3-787A-4A4B-B180-530FA361CE21}"/>
+              </a:ext>
+            </a:extLst>
+          </p:cNvPr>
+          <p:cNvSpPr/>
+          <p:nvPr/>
+        </p:nvSpPr>
+        <p:spPr bwMode="auto">
+          <a:xfrm rot="10800000" flipH="1" flipV="1">
+            <a:off x="6224260" y="3873933"/>
+            <a:ext cx="63340" cy="63340"/>
+          </a:xfrm>
+          <a:prstGeom prst="ellipse">
+            <a:avLst/>
+          </a:prstGeom>
+          <a:solidFill>
+            <a:schemeClr val="tx1"/>
+          </a:solidFill>
+          <a:ln w="1778" cap="flat" cmpd="sng" algn="ctr">
+            <a:solidFill>
+              <a:schemeClr val="accent1"/>
+            </a:solidFill>
+            <a:prstDash val="solid"/>
+            <a:round/>
+            <a:headEnd type="none" w="med" len="med"/>
+            <a:tailEnd type="none" w="med" len="med"/>
+          </a:ln>
+          <a:effectLst/>
+        </p:spPr>
+        <p:txBody>
+          <a:bodyPr vert="horz" wrap="square" lIns="91440" tIns="45720" rIns="91440" bIns="45720" numCol="1" rtlCol="0" anchor="t" anchorCtr="0" compatLnSpc="1">
+            <a:prstTxWarp prst="textNoShape">
+              <a:avLst/>
+            </a:prstTxWarp>
+            <a:noAutofit/>
+          </a:bodyPr>
+          <a:lstStyle/>
+          <a:p>
+            <a:pPr marL="0" marR="0" indent="0" algn="l" defTabSz="914400" rtl="0" eaLnBrk="1" fontAlgn="base" latinLnBrk="0" hangingPunct="1">
+              <a:lnSpc>
+                <a:spcPct val="95000"/>
+              </a:lnSpc>
+              <a:spcBef>
+                <a:spcPct val="0"/>
+              </a:spcBef>
+              <a:spcAft>
+                <a:spcPct val="0"/>
+              </a:spcAft>
+              <a:buClrTx/>
+              <a:buSzTx/>
+              <a:buFont typeface="AU Passata" pitchFamily="34" charset="0"/>
+              <a:buNone/>
+              <a:tabLst/>
+            </a:pPr>
+            <a:endParaRPr kumimoji="0" lang="en-DK" sz="1600" b="0" i="0" u="none" strike="noStrike" cap="none" normalizeH="0" baseline="0" dirty="0" err="1">
+              <a:ln>
+                <a:noFill/>
+              </a:ln>
+              <a:solidFill>
+                <a:schemeClr val="bg1"/>
+              </a:solidFill>
+              <a:effectLst/>
+              <a:latin typeface="AU Passata" pitchFamily="34" charset="0"/>
+            </a:endParaRPr>
+          </a:p>
+        </p:txBody>
+      </p:sp>
+      <p:cxnSp>
+        <p:nvCxnSpPr>
+          <p:cNvPr id="42" name="Straight Connector 41">
+            <a:extLst>
+              <a:ext uri="{FF2B5EF4-FFF2-40B4-BE49-F238E27FC236}">
+                <a16:creationId xmlns:a16="http://schemas.microsoft.com/office/drawing/2014/main" id="{4CFC5462-FE24-A942-8190-9BA4786C4545}"/>
+              </a:ext>
+            </a:extLst>
+          </p:cNvPr>
+          <p:cNvCxnSpPr>
+            <a:cxnSpLocks/>
+            <a:stCxn id="41" idx="6"/>
+          </p:cNvCxnSpPr>
+          <p:nvPr/>
+        </p:nvCxnSpPr>
+        <p:spPr bwMode="auto">
+          <a:xfrm flipH="1">
+            <a:off x="6093946" y="3905603"/>
+            <a:ext cx="193654" cy="0"/>
+          </a:xfrm>
+          <a:prstGeom prst="line">
+            <a:avLst/>
+          </a:prstGeom>
+          <a:solidFill>
+            <a:schemeClr val="accent2"/>
+          </a:solidFill>
+          <a:ln w="19050" cap="flat" cmpd="sng" algn="ctr">
+            <a:solidFill>
+              <a:schemeClr val="accent1"/>
+            </a:solidFill>
+            <a:prstDash val="solid"/>
+            <a:round/>
+            <a:headEnd type="none" w="med" len="med"/>
+            <a:tailEnd type="none" w="med" len="med"/>
+          </a:ln>
+          <a:effectLst/>
+        </p:spPr>
+      </p:cxnSp>
+      <p:sp>
+        <p:nvSpPr>
+          <p:cNvPr id="50" name="Oval 49">
+            <a:extLst>
+              <a:ext uri="{FF2B5EF4-FFF2-40B4-BE49-F238E27FC236}">
+                <a16:creationId xmlns:a16="http://schemas.microsoft.com/office/drawing/2014/main" id="{16AD881B-9DFF-914F-BB0C-2121E53FF337}"/>
+              </a:ext>
+            </a:extLst>
+          </p:cNvPr>
+          <p:cNvSpPr/>
+          <p:nvPr/>
+        </p:nvSpPr>
+        <p:spPr bwMode="auto">
+          <a:xfrm flipH="1" flipV="1">
+            <a:off x="5900224" y="2623179"/>
+            <a:ext cx="63340" cy="63340"/>
+          </a:xfrm>
+          <a:prstGeom prst="ellipse">
+            <a:avLst/>
+          </a:prstGeom>
+          <a:solidFill>
+            <a:schemeClr val="tx1"/>
+          </a:solidFill>
+          <a:ln w="1778" cap="flat" cmpd="sng" algn="ctr">
+            <a:solidFill>
+              <a:schemeClr val="accent1"/>
+            </a:solidFill>
+            <a:prstDash val="solid"/>
+            <a:round/>
+            <a:headEnd type="none" w="med" len="med"/>
+            <a:tailEnd type="none" w="med" len="med"/>
+          </a:ln>
+          <a:effectLst/>
+        </p:spPr>
+        <p:txBody>
+          <a:bodyPr vert="horz" wrap="square" lIns="91440" tIns="45720" rIns="91440" bIns="45720" numCol="1" rtlCol="0" anchor="t" anchorCtr="0" compatLnSpc="1">
+            <a:prstTxWarp prst="textNoShape">
+              <a:avLst/>
+            </a:prstTxWarp>
+            <a:noAutofit/>
+          </a:bodyPr>
+          <a:lstStyle/>
+          <a:p>
+            <a:pPr marL="0" marR="0" indent="0" algn="l" defTabSz="914400" rtl="0" eaLnBrk="1" fontAlgn="base" latinLnBrk="0" hangingPunct="1">
+              <a:lnSpc>
+                <a:spcPct val="95000"/>
+              </a:lnSpc>
+              <a:spcBef>
+                <a:spcPct val="0"/>
+              </a:spcBef>
+              <a:spcAft>
+                <a:spcPct val="0"/>
+              </a:spcAft>
+              <a:buClrTx/>
+              <a:buSzTx/>
+              <a:buFont typeface="AU Passata" pitchFamily="34" charset="0"/>
+              <a:buNone/>
+              <a:tabLst/>
+            </a:pPr>
+            <a:endParaRPr kumimoji="0" lang="en-DK" sz="1600" b="0" i="0" u="none" strike="noStrike" cap="none" normalizeH="0" baseline="0" dirty="0" err="1">
+              <a:ln>
+                <a:noFill/>
+              </a:ln>
+              <a:solidFill>
+                <a:schemeClr val="bg1"/>
+              </a:solidFill>
+              <a:effectLst/>
+              <a:latin typeface="AU Passata" pitchFamily="34" charset="0"/>
+            </a:endParaRPr>
+          </a:p>
+        </p:txBody>
+      </p:sp>
+      <p:cxnSp>
+        <p:nvCxnSpPr>
+          <p:cNvPr id="51" name="Straight Connector 50">
+            <a:extLst>
+              <a:ext uri="{FF2B5EF4-FFF2-40B4-BE49-F238E27FC236}">
+                <a16:creationId xmlns:a16="http://schemas.microsoft.com/office/drawing/2014/main" id="{FD23A383-08E7-2145-81C9-CBAD390865D5}"/>
+              </a:ext>
+            </a:extLst>
+          </p:cNvPr>
+          <p:cNvCxnSpPr>
+            <a:cxnSpLocks/>
+            <a:stCxn id="50" idx="6"/>
+          </p:cNvCxnSpPr>
+          <p:nvPr/>
+        </p:nvCxnSpPr>
+        <p:spPr bwMode="auto">
+          <a:xfrm>
+            <a:off x="5900224" y="2654849"/>
+            <a:ext cx="193655" cy="0"/>
+          </a:xfrm>
+          <a:prstGeom prst="line">
+            <a:avLst/>
+          </a:prstGeom>
+          <a:solidFill>
+            <a:schemeClr val="accent2"/>
+          </a:solidFill>
+          <a:ln w="19050" cap="flat" cmpd="sng" algn="ctr">
+            <a:solidFill>
+              <a:schemeClr val="accent1"/>
+            </a:solidFill>
+            <a:prstDash val="solid"/>
+            <a:round/>
+            <a:headEnd type="none" w="med" len="med"/>
+            <a:tailEnd type="none" w="med" len="med"/>
+          </a:ln>
+          <a:effectLst/>
+        </p:spPr>
+      </p:cxnSp>
+      <p:sp>
+        <p:nvSpPr>
+          <p:cNvPr id="57" name="Oval 56">
+            <a:extLst>
+              <a:ext uri="{FF2B5EF4-FFF2-40B4-BE49-F238E27FC236}">
+                <a16:creationId xmlns:a16="http://schemas.microsoft.com/office/drawing/2014/main" id="{9E3F8F78-6545-7744-ACD1-9805B65133C4}"/>
+              </a:ext>
+            </a:extLst>
+          </p:cNvPr>
+          <p:cNvSpPr/>
+          <p:nvPr/>
+        </p:nvSpPr>
+        <p:spPr bwMode="auto">
+          <a:xfrm flipH="1" flipV="1">
+            <a:off x="5900224" y="3022425"/>
+            <a:ext cx="63340" cy="63340"/>
+          </a:xfrm>
+          <a:prstGeom prst="ellipse">
+            <a:avLst/>
+          </a:prstGeom>
+          <a:solidFill>
+            <a:schemeClr val="tx1"/>
+          </a:solidFill>
+          <a:ln w="1778" cap="flat" cmpd="sng" algn="ctr">
+            <a:solidFill>
+              <a:schemeClr val="accent1"/>
+            </a:solidFill>
+            <a:prstDash val="solid"/>
+            <a:round/>
+            <a:headEnd type="none" w="med" len="med"/>
+            <a:tailEnd type="none" w="med" len="med"/>
+          </a:ln>
+          <a:effectLst/>
+        </p:spPr>
+        <p:txBody>
+          <a:bodyPr vert="horz" wrap="square" lIns="91440" tIns="45720" rIns="91440" bIns="45720" numCol="1" rtlCol="0" anchor="t" anchorCtr="0" compatLnSpc="1">
+            <a:prstTxWarp prst="textNoShape">
+              <a:avLst/>
+            </a:prstTxWarp>
+            <a:noAutofit/>
+          </a:bodyPr>
+          <a:lstStyle/>
+          <a:p>
+            <a:pPr marL="0" marR="0" indent="0" algn="l" defTabSz="914400" rtl="0" eaLnBrk="1" fontAlgn="base" latinLnBrk="0" hangingPunct="1">
+              <a:lnSpc>
+                <a:spcPct val="95000"/>
+              </a:lnSpc>
+              <a:spcBef>
+                <a:spcPct val="0"/>
+              </a:spcBef>
+              <a:spcAft>
+                <a:spcPct val="0"/>
+              </a:spcAft>
+              <a:buClrTx/>
+              <a:buSzTx/>
+              <a:buFont typeface="AU Passata" pitchFamily="34" charset="0"/>
+              <a:buNone/>
+              <a:tabLst/>
+            </a:pPr>
+            <a:endParaRPr kumimoji="0" lang="en-DK" sz="1600" b="0" i="0" u="none" strike="noStrike" cap="none" normalizeH="0" baseline="0" dirty="0" err="1">
+              <a:ln>
+                <a:noFill/>
+              </a:ln>
+              <a:solidFill>
+                <a:schemeClr val="bg1"/>
+              </a:solidFill>
+              <a:effectLst/>
+              <a:latin typeface="AU Passata" pitchFamily="34" charset="0"/>
+            </a:endParaRPr>
+          </a:p>
+        </p:txBody>
+      </p:sp>
+      <p:cxnSp>
+        <p:nvCxnSpPr>
+          <p:cNvPr id="58" name="Straight Connector 57">
+            <a:extLst>
+              <a:ext uri="{FF2B5EF4-FFF2-40B4-BE49-F238E27FC236}">
+                <a16:creationId xmlns:a16="http://schemas.microsoft.com/office/drawing/2014/main" id="{1433FCB5-73FF-5745-B3D6-13A32C346FB4}"/>
+              </a:ext>
+            </a:extLst>
+          </p:cNvPr>
+          <p:cNvCxnSpPr>
+            <a:cxnSpLocks/>
+            <a:stCxn id="57" idx="6"/>
+          </p:cNvCxnSpPr>
+          <p:nvPr/>
+        </p:nvCxnSpPr>
+        <p:spPr bwMode="auto">
+          <a:xfrm>
+            <a:off x="5900224" y="3054095"/>
+            <a:ext cx="193655" cy="0"/>
+          </a:xfrm>
+          <a:prstGeom prst="line">
+            <a:avLst/>
+          </a:prstGeom>
+          <a:solidFill>
+            <a:schemeClr val="accent2"/>
+          </a:solidFill>
+          <a:ln w="19050" cap="flat" cmpd="sng" algn="ctr">
+            <a:solidFill>
+              <a:schemeClr val="accent1"/>
+            </a:solidFill>
+            <a:prstDash val="solid"/>
+            <a:round/>
+            <a:headEnd type="none" w="med" len="med"/>
+            <a:tailEnd type="none" w="med" len="med"/>
+          </a:ln>
+          <a:effectLst/>
+        </p:spPr>
+      </p:cxnSp>
+      <p:sp>
+        <p:nvSpPr>
+          <p:cNvPr id="55" name="Oval 54">
+            <a:extLst>
+              <a:ext uri="{FF2B5EF4-FFF2-40B4-BE49-F238E27FC236}">
+                <a16:creationId xmlns:a16="http://schemas.microsoft.com/office/drawing/2014/main" id="{D9EC56DD-CC6D-094E-BB57-194A5E2498EE}"/>
+              </a:ext>
+            </a:extLst>
+          </p:cNvPr>
+          <p:cNvSpPr/>
+          <p:nvPr/>
+        </p:nvSpPr>
+        <p:spPr bwMode="auto">
+          <a:xfrm rot="10800000" flipH="1" flipV="1">
+            <a:off x="6224260" y="3022425"/>
+            <a:ext cx="63340" cy="63340"/>
+          </a:xfrm>
+          <a:prstGeom prst="ellipse">
+            <a:avLst/>
+          </a:prstGeom>
+          <a:solidFill>
+            <a:schemeClr val="tx1"/>
+          </a:solidFill>
+          <a:ln w="1778" cap="flat" cmpd="sng" algn="ctr">
+            <a:solidFill>
+              <a:schemeClr val="accent1"/>
+            </a:solidFill>
+            <a:prstDash val="solid"/>
+            <a:round/>
+            <a:headEnd type="none" w="med" len="med"/>
+            <a:tailEnd type="none" w="med" len="med"/>
+          </a:ln>
+          <a:effectLst/>
+        </p:spPr>
+        <p:txBody>
+          <a:bodyPr vert="horz" wrap="square" lIns="91440" tIns="45720" rIns="91440" bIns="45720" numCol="1" rtlCol="0" anchor="t" anchorCtr="0" compatLnSpc="1">
+            <a:prstTxWarp prst="textNoShape">
+              <a:avLst/>
+            </a:prstTxWarp>
+            <a:noAutofit/>
+          </a:bodyPr>
+          <a:lstStyle/>
+          <a:p>
+            <a:pPr marL="0" marR="0" indent="0" algn="l" defTabSz="914400" rtl="0" eaLnBrk="1" fontAlgn="base" latinLnBrk="0" hangingPunct="1">
+              <a:lnSpc>
+                <a:spcPct val="95000"/>
+              </a:lnSpc>
+              <a:spcBef>
+                <a:spcPct val="0"/>
+              </a:spcBef>
+              <a:spcAft>
+                <a:spcPct val="0"/>
+              </a:spcAft>
+              <a:buClrTx/>
+              <a:buSzTx/>
+              <a:buFont typeface="AU Passata" pitchFamily="34" charset="0"/>
+              <a:buNone/>
+              <a:tabLst/>
+            </a:pPr>
+            <a:endParaRPr kumimoji="0" lang="en-DK" sz="1600" b="0" i="0" u="none" strike="noStrike" cap="none" normalizeH="0" baseline="0" dirty="0" err="1">
+              <a:ln>
+                <a:noFill/>
+              </a:ln>
+              <a:solidFill>
+                <a:schemeClr val="bg1"/>
+              </a:solidFill>
+              <a:effectLst/>
+              <a:latin typeface="AU Passata" pitchFamily="34" charset="0"/>
+            </a:endParaRPr>
+          </a:p>
+        </p:txBody>
+      </p:sp>
+      <p:cxnSp>
+        <p:nvCxnSpPr>
+          <p:cNvPr id="56" name="Straight Connector 55">
+            <a:extLst>
+              <a:ext uri="{FF2B5EF4-FFF2-40B4-BE49-F238E27FC236}">
+                <a16:creationId xmlns:a16="http://schemas.microsoft.com/office/drawing/2014/main" id="{C026CE7E-9A62-D44B-8753-1F4B1639C9E6}"/>
+              </a:ext>
+            </a:extLst>
+          </p:cNvPr>
+          <p:cNvCxnSpPr>
+            <a:cxnSpLocks/>
+            <a:stCxn id="55" idx="6"/>
+          </p:cNvCxnSpPr>
+          <p:nvPr/>
+        </p:nvCxnSpPr>
+        <p:spPr bwMode="auto">
+          <a:xfrm flipH="1">
+            <a:off x="6093946" y="3054095"/>
+            <a:ext cx="193654" cy="0"/>
+          </a:xfrm>
+          <a:prstGeom prst="line">
+            <a:avLst/>
+          </a:prstGeom>
+          <a:solidFill>
+            <a:schemeClr val="accent2"/>
+          </a:solidFill>
+          <a:ln w="19050" cap="flat" cmpd="sng" algn="ctr">
+            <a:solidFill>
+              <a:schemeClr val="accent1"/>
+            </a:solidFill>
+            <a:prstDash val="solid"/>
+            <a:round/>
+            <a:headEnd type="none" w="med" len="med"/>
+            <a:tailEnd type="none" w="med" len="med"/>
+          </a:ln>
+          <a:effectLst/>
+        </p:spPr>
+      </p:cxnSp>
+      <p:sp>
+        <p:nvSpPr>
+          <p:cNvPr id="60" name="Oval 59">
+            <a:extLst>
+              <a:ext uri="{FF2B5EF4-FFF2-40B4-BE49-F238E27FC236}">
+                <a16:creationId xmlns:a16="http://schemas.microsoft.com/office/drawing/2014/main" id="{569E51D1-A6EC-3640-9B61-8EA217963E43}"/>
+              </a:ext>
+            </a:extLst>
+          </p:cNvPr>
+          <p:cNvSpPr/>
+          <p:nvPr/>
+        </p:nvSpPr>
+        <p:spPr bwMode="auto">
+          <a:xfrm flipH="1" flipV="1">
+            <a:off x="5882028" y="1737717"/>
+            <a:ext cx="63340" cy="63340"/>
+          </a:xfrm>
+          <a:prstGeom prst="ellipse">
+            <a:avLst/>
+          </a:prstGeom>
+          <a:solidFill>
+            <a:schemeClr val="tx1"/>
+          </a:solidFill>
+          <a:ln w="1778" cap="flat" cmpd="sng" algn="ctr">
+            <a:solidFill>
+              <a:schemeClr val="accent1"/>
+            </a:solidFill>
+            <a:prstDash val="solid"/>
+            <a:round/>
+            <a:headEnd type="none" w="med" len="med"/>
+            <a:tailEnd type="none" w="med" len="med"/>
+          </a:ln>
+          <a:effectLst/>
+        </p:spPr>
+        <p:txBody>
+          <a:bodyPr vert="horz" wrap="square" lIns="91440" tIns="45720" rIns="91440" bIns="45720" numCol="1" rtlCol="0" anchor="t" anchorCtr="0" compatLnSpc="1">
+            <a:prstTxWarp prst="textNoShape">
+              <a:avLst/>
+            </a:prstTxWarp>
+            <a:noAutofit/>
+          </a:bodyPr>
+          <a:lstStyle/>
+          <a:p>
+            <a:pPr marL="0" marR="0" indent="0" algn="l" defTabSz="914400" rtl="0" eaLnBrk="1" fontAlgn="base" latinLnBrk="0" hangingPunct="1">
+              <a:lnSpc>
+                <a:spcPct val="95000"/>
+              </a:lnSpc>
+              <a:spcBef>
+                <a:spcPct val="0"/>
+              </a:spcBef>
+              <a:spcAft>
+                <a:spcPct val="0"/>
+              </a:spcAft>
+              <a:buClrTx/>
+              <a:buSzTx/>
+              <a:buFont typeface="AU Passata" pitchFamily="34" charset="0"/>
+              <a:buNone/>
+              <a:tabLst/>
+            </a:pPr>
+            <a:endParaRPr kumimoji="0" lang="en-DK" sz="1600" b="0" i="0" u="none" strike="noStrike" cap="none" normalizeH="0" baseline="0" dirty="0" err="1">
+              <a:ln>
+                <a:noFill/>
+              </a:ln>
+              <a:solidFill>
+                <a:schemeClr val="bg1"/>
+              </a:solidFill>
+              <a:effectLst/>
+              <a:latin typeface="AU Passata" pitchFamily="34" charset="0"/>
+            </a:endParaRPr>
+          </a:p>
+        </p:txBody>
+      </p:sp>
+      <p:cxnSp>
+        <p:nvCxnSpPr>
+          <p:cNvPr id="61" name="Straight Connector 60">
+            <a:extLst>
+              <a:ext uri="{FF2B5EF4-FFF2-40B4-BE49-F238E27FC236}">
+                <a16:creationId xmlns:a16="http://schemas.microsoft.com/office/drawing/2014/main" id="{2AAE8AF9-8683-A54A-878B-D67BF1F071B7}"/>
+              </a:ext>
+            </a:extLst>
+          </p:cNvPr>
+          <p:cNvCxnSpPr>
+            <a:cxnSpLocks/>
+            <a:stCxn id="60" idx="6"/>
+          </p:cNvCxnSpPr>
+          <p:nvPr/>
+        </p:nvCxnSpPr>
+        <p:spPr bwMode="auto">
+          <a:xfrm>
+            <a:off x="5882028" y="1769387"/>
+            <a:ext cx="193655" cy="0"/>
+          </a:xfrm>
+          <a:prstGeom prst="line">
+            <a:avLst/>
+          </a:prstGeom>
+          <a:solidFill>
+            <a:schemeClr val="accent2"/>
+          </a:solidFill>
+          <a:ln w="19050" cap="flat" cmpd="sng" algn="ctr">
+            <a:solidFill>
+              <a:schemeClr val="accent1"/>
+            </a:solidFill>
+            <a:prstDash val="solid"/>
+            <a:round/>
+            <a:headEnd type="none" w="med" len="med"/>
+            <a:tailEnd type="none" w="med" len="med"/>
+          </a:ln>
+          <a:effectLst/>
+        </p:spPr>
+      </p:cxnSp>
+      <p:sp>
+        <p:nvSpPr>
+          <p:cNvPr id="63" name="Oval 62">
+            <a:extLst>
+              <a:ext uri="{FF2B5EF4-FFF2-40B4-BE49-F238E27FC236}">
+                <a16:creationId xmlns:a16="http://schemas.microsoft.com/office/drawing/2014/main" id="{891E8579-E197-EE44-B81E-9A600C28A166}"/>
+              </a:ext>
+            </a:extLst>
+          </p:cNvPr>
+          <p:cNvSpPr/>
+          <p:nvPr/>
+        </p:nvSpPr>
+        <p:spPr bwMode="auto">
+          <a:xfrm rot="10800000" flipH="1" flipV="1">
+            <a:off x="6214522" y="1869684"/>
+            <a:ext cx="63340" cy="63340"/>
+          </a:xfrm>
+          <a:prstGeom prst="ellipse">
+            <a:avLst/>
+          </a:prstGeom>
+          <a:solidFill>
+            <a:schemeClr val="tx1"/>
+          </a:solidFill>
+          <a:ln w="1778" cap="flat" cmpd="sng" algn="ctr">
+            <a:solidFill>
+              <a:schemeClr val="accent1"/>
+            </a:solidFill>
+            <a:prstDash val="solid"/>
+            <a:round/>
+            <a:headEnd type="none" w="med" len="med"/>
+            <a:tailEnd type="none" w="med" len="med"/>
+          </a:ln>
+          <a:effectLst/>
+        </p:spPr>
+        <p:txBody>
+          <a:bodyPr vert="horz" wrap="square" lIns="91440" tIns="45720" rIns="91440" bIns="45720" numCol="1" rtlCol="0" anchor="t" anchorCtr="0" compatLnSpc="1">
+            <a:prstTxWarp prst="textNoShape">
+              <a:avLst/>
+            </a:prstTxWarp>
+            <a:noAutofit/>
+          </a:bodyPr>
+          <a:lstStyle/>
+          <a:p>
+            <a:pPr marL="0" marR="0" indent="0" algn="l" defTabSz="914400" rtl="0" eaLnBrk="1" fontAlgn="base" latinLnBrk="0" hangingPunct="1">
+              <a:lnSpc>
+                <a:spcPct val="95000"/>
+              </a:lnSpc>
+              <a:spcBef>
+                <a:spcPct val="0"/>
+              </a:spcBef>
+              <a:spcAft>
+                <a:spcPct val="0"/>
+              </a:spcAft>
+              <a:buClrTx/>
+              <a:buSzTx/>
+              <a:buFont typeface="AU Passata" pitchFamily="34" charset="0"/>
+              <a:buNone/>
+              <a:tabLst/>
+            </a:pPr>
+            <a:endParaRPr kumimoji="0" lang="en-DK" sz="1600" b="0" i="0" u="none" strike="noStrike" cap="none" normalizeH="0" baseline="0" dirty="0" err="1">
+              <a:ln>
+                <a:noFill/>
+              </a:ln>
+              <a:solidFill>
+                <a:schemeClr val="bg1"/>
+              </a:solidFill>
+              <a:effectLst/>
+              <a:latin typeface="AU Passata" pitchFamily="34" charset="0"/>
+            </a:endParaRPr>
+          </a:p>
+        </p:txBody>
+      </p:sp>
+      <p:cxnSp>
+        <p:nvCxnSpPr>
+          <p:cNvPr id="64" name="Straight Connector 63">
+            <a:extLst>
+              <a:ext uri="{FF2B5EF4-FFF2-40B4-BE49-F238E27FC236}">
+                <a16:creationId xmlns:a16="http://schemas.microsoft.com/office/drawing/2014/main" id="{6F82748C-7987-7C47-B8EF-45736DD4B45C}"/>
+              </a:ext>
+            </a:extLst>
+          </p:cNvPr>
+          <p:cNvCxnSpPr>
+            <a:cxnSpLocks/>
+            <a:stCxn id="63" idx="6"/>
+          </p:cNvCxnSpPr>
+          <p:nvPr/>
+        </p:nvCxnSpPr>
+        <p:spPr bwMode="auto">
+          <a:xfrm flipH="1">
+            <a:off x="6084208" y="1901354"/>
+            <a:ext cx="193654" cy="0"/>
+          </a:xfrm>
+          <a:prstGeom prst="line">
+            <a:avLst/>
+          </a:prstGeom>
+          <a:solidFill>
+            <a:schemeClr val="accent2"/>
+          </a:solidFill>
+          <a:ln w="19050" cap="flat" cmpd="sng" algn="ctr">
+            <a:solidFill>
+              <a:schemeClr val="accent1"/>
+            </a:solidFill>
+            <a:prstDash val="solid"/>
+            <a:round/>
+            <a:headEnd type="none" w="med" len="med"/>
+            <a:tailEnd type="none" w="med" len="med"/>
+          </a:ln>
+          <a:effectLst/>
+        </p:spPr>
+      </p:cxnSp>
+      <p:sp>
+        <p:nvSpPr>
+          <p:cNvPr id="66" name="Oval 65">
+            <a:extLst>
+              <a:ext uri="{FF2B5EF4-FFF2-40B4-BE49-F238E27FC236}">
+                <a16:creationId xmlns:a16="http://schemas.microsoft.com/office/drawing/2014/main" id="{319EEB36-D4F3-4949-8C7F-65D02DC37B75}"/>
+              </a:ext>
+            </a:extLst>
+          </p:cNvPr>
+          <p:cNvSpPr/>
+          <p:nvPr/>
+        </p:nvSpPr>
+        <p:spPr bwMode="auto">
+          <a:xfrm flipH="1" flipV="1">
+            <a:off x="5882094" y="2013213"/>
+            <a:ext cx="63340" cy="63340"/>
+          </a:xfrm>
+          <a:prstGeom prst="ellipse">
+            <a:avLst/>
+          </a:prstGeom>
+          <a:solidFill>
+            <a:schemeClr val="tx1"/>
+          </a:solidFill>
+          <a:ln w="1778" cap="flat" cmpd="sng" algn="ctr">
+            <a:solidFill>
+              <a:schemeClr val="accent1"/>
+            </a:solidFill>
+            <a:prstDash val="solid"/>
+            <a:round/>
+            <a:headEnd type="none" w="med" len="med"/>
+            <a:tailEnd type="none" w="med" len="med"/>
+          </a:ln>
+          <a:effectLst/>
+        </p:spPr>
+        <p:txBody>
+          <a:bodyPr vert="horz" wrap="square" lIns="91440" tIns="45720" rIns="91440" bIns="45720" numCol="1" rtlCol="0" anchor="t" anchorCtr="0" compatLnSpc="1">
+            <a:prstTxWarp prst="textNoShape">
+              <a:avLst/>
+            </a:prstTxWarp>
+            <a:noAutofit/>
+          </a:bodyPr>
+          <a:lstStyle/>
+          <a:p>
+            <a:pPr marL="0" marR="0" indent="0" algn="l" defTabSz="914400" rtl="0" eaLnBrk="1" fontAlgn="base" latinLnBrk="0" hangingPunct="1">
+              <a:lnSpc>
+                <a:spcPct val="95000"/>
+              </a:lnSpc>
+              <a:spcBef>
+                <a:spcPct val="0"/>
+              </a:spcBef>
+              <a:spcAft>
+                <a:spcPct val="0"/>
+              </a:spcAft>
+              <a:buClrTx/>
+              <a:buSzTx/>
+              <a:buFont typeface="AU Passata" pitchFamily="34" charset="0"/>
+              <a:buNone/>
+              <a:tabLst/>
+            </a:pPr>
+            <a:endParaRPr kumimoji="0" lang="en-DK" sz="1600" b="0" i="0" u="none" strike="noStrike" cap="none" normalizeH="0" baseline="0" dirty="0" err="1">
+              <a:ln>
+                <a:noFill/>
+              </a:ln>
+              <a:solidFill>
+                <a:schemeClr val="bg1"/>
+              </a:solidFill>
+              <a:effectLst/>
+              <a:latin typeface="AU Passata" pitchFamily="34" charset="0"/>
+            </a:endParaRPr>
+          </a:p>
+        </p:txBody>
+      </p:sp>
+      <p:cxnSp>
+        <p:nvCxnSpPr>
+          <p:cNvPr id="67" name="Straight Connector 66">
+            <a:extLst>
+              <a:ext uri="{FF2B5EF4-FFF2-40B4-BE49-F238E27FC236}">
+                <a16:creationId xmlns:a16="http://schemas.microsoft.com/office/drawing/2014/main" id="{BF161362-6E71-7A42-B688-0A9593537C57}"/>
+              </a:ext>
+            </a:extLst>
+          </p:cNvPr>
+          <p:cNvCxnSpPr>
+            <a:cxnSpLocks/>
+            <a:stCxn id="66" idx="6"/>
+          </p:cNvCxnSpPr>
+          <p:nvPr/>
+        </p:nvCxnSpPr>
+        <p:spPr bwMode="auto">
+          <a:xfrm>
+            <a:off x="5882094" y="2044883"/>
+            <a:ext cx="193655" cy="0"/>
+          </a:xfrm>
+          <a:prstGeom prst="line">
+            <a:avLst/>
+          </a:prstGeom>
+          <a:solidFill>
+            <a:schemeClr val="accent2"/>
+          </a:solidFill>
+          <a:ln w="19050" cap="flat" cmpd="sng" algn="ctr">
+            <a:solidFill>
+              <a:schemeClr val="accent1"/>
+            </a:solidFill>
+            <a:prstDash val="solid"/>
+            <a:round/>
+            <a:headEnd type="none" w="med" len="med"/>
+            <a:tailEnd type="none" w="med" len="med"/>
+          </a:ln>
+          <a:effectLst/>
+        </p:spPr>
+      </p:cxnSp>
+      <p:sp>
+        <p:nvSpPr>
+          <p:cNvPr id="69" name="Oval 68">
+            <a:extLst>
+              <a:ext uri="{FF2B5EF4-FFF2-40B4-BE49-F238E27FC236}">
+                <a16:creationId xmlns:a16="http://schemas.microsoft.com/office/drawing/2014/main" id="{5DDC884D-E77B-D24E-93CC-D634D57AB1B5}"/>
+              </a:ext>
+            </a:extLst>
+          </p:cNvPr>
+          <p:cNvSpPr/>
+          <p:nvPr/>
+        </p:nvSpPr>
+        <p:spPr bwMode="auto">
+          <a:xfrm rot="10800000" flipH="1" flipV="1">
+            <a:off x="6205998" y="2163294"/>
+            <a:ext cx="63340" cy="63340"/>
+          </a:xfrm>
+          <a:prstGeom prst="ellipse">
+            <a:avLst/>
+          </a:prstGeom>
+          <a:solidFill>
+            <a:schemeClr val="tx1"/>
+          </a:solidFill>
+          <a:ln w="1778" cap="flat" cmpd="sng" algn="ctr">
+            <a:solidFill>
+              <a:schemeClr val="accent1"/>
+            </a:solidFill>
+            <a:prstDash val="solid"/>
+            <a:round/>
+            <a:headEnd type="none" w="med" len="med"/>
+            <a:tailEnd type="none" w="med" len="med"/>
+          </a:ln>
+          <a:effectLst/>
+        </p:spPr>
+        <p:txBody>
+          <a:bodyPr vert="horz" wrap="square" lIns="91440" tIns="45720" rIns="91440" bIns="45720" numCol="1" rtlCol="0" anchor="t" anchorCtr="0" compatLnSpc="1">
+            <a:prstTxWarp prst="textNoShape">
+              <a:avLst/>
+            </a:prstTxWarp>
+            <a:noAutofit/>
+          </a:bodyPr>
+          <a:lstStyle/>
+          <a:p>
+            <a:pPr marL="0" marR="0" indent="0" algn="l" defTabSz="914400" rtl="0" eaLnBrk="1" fontAlgn="base" latinLnBrk="0" hangingPunct="1">
+              <a:lnSpc>
+                <a:spcPct val="95000"/>
+              </a:lnSpc>
+              <a:spcBef>
+                <a:spcPct val="0"/>
+              </a:spcBef>
+              <a:spcAft>
+                <a:spcPct val="0"/>
+              </a:spcAft>
+              <a:buClrTx/>
+              <a:buSzTx/>
+              <a:buFont typeface="AU Passata" pitchFamily="34" charset="0"/>
+              <a:buNone/>
+              <a:tabLst/>
+            </a:pPr>
+            <a:endParaRPr kumimoji="0" lang="en-DK" sz="1600" b="0" i="0" u="none" strike="noStrike" cap="none" normalizeH="0" baseline="0" dirty="0" err="1">
+              <a:ln>
+                <a:noFill/>
+              </a:ln>
+              <a:solidFill>
+                <a:schemeClr val="bg1"/>
+              </a:solidFill>
+              <a:effectLst/>
+              <a:latin typeface="AU Passata" pitchFamily="34" charset="0"/>
+            </a:endParaRPr>
+          </a:p>
+        </p:txBody>
+      </p:sp>
+      <p:cxnSp>
+        <p:nvCxnSpPr>
+          <p:cNvPr id="70" name="Straight Connector 69">
+            <a:extLst>
+              <a:ext uri="{FF2B5EF4-FFF2-40B4-BE49-F238E27FC236}">
+                <a16:creationId xmlns:a16="http://schemas.microsoft.com/office/drawing/2014/main" id="{FD8434D7-10FF-C34D-B852-02C8893D7DB9}"/>
+              </a:ext>
+            </a:extLst>
+          </p:cNvPr>
+          <p:cNvCxnSpPr>
+            <a:cxnSpLocks/>
+            <a:stCxn id="69" idx="6"/>
+          </p:cNvCxnSpPr>
+          <p:nvPr/>
+        </p:nvCxnSpPr>
+        <p:spPr bwMode="auto">
+          <a:xfrm flipH="1">
+            <a:off x="6075684" y="2194964"/>
+            <a:ext cx="193654" cy="0"/>
+          </a:xfrm>
+          <a:prstGeom prst="line">
+            <a:avLst/>
+          </a:prstGeom>
+          <a:solidFill>
+            <a:schemeClr val="accent2"/>
+          </a:solidFill>
+          <a:ln w="19050" cap="flat" cmpd="sng" algn="ctr">
+            <a:solidFill>
+              <a:schemeClr val="accent1"/>
+            </a:solidFill>
+            <a:prstDash val="solid"/>
+            <a:round/>
+            <a:headEnd type="none" w="med" len="med"/>
+            <a:tailEnd type="none" w="med" len="med"/>
+          </a:ln>
+          <a:effectLst/>
+        </p:spPr>
+      </p:cxnSp>
+      <p:sp>
+        <p:nvSpPr>
+          <p:cNvPr id="86" name="Oval 85">
+            <a:extLst>
+              <a:ext uri="{FF2B5EF4-FFF2-40B4-BE49-F238E27FC236}">
+                <a16:creationId xmlns:a16="http://schemas.microsoft.com/office/drawing/2014/main" id="{50668D61-F13D-6D41-B133-99DCEBDAA799}"/>
+              </a:ext>
+            </a:extLst>
+          </p:cNvPr>
+          <p:cNvSpPr/>
+          <p:nvPr/>
+        </p:nvSpPr>
+        <p:spPr bwMode="auto">
+          <a:xfrm rot="10800000" flipH="1" flipV="1">
+            <a:off x="7169297" y="3873933"/>
+            <a:ext cx="63340" cy="63340"/>
+          </a:xfrm>
+          <a:prstGeom prst="ellipse">
+            <a:avLst/>
+          </a:prstGeom>
+          <a:solidFill>
+            <a:schemeClr val="tx1"/>
+          </a:solidFill>
+          <a:ln w="1778" cap="flat" cmpd="sng" algn="ctr">
+            <a:solidFill>
+              <a:schemeClr val="accent1"/>
+            </a:solidFill>
+            <a:prstDash val="solid"/>
+            <a:round/>
+            <a:headEnd type="none" w="med" len="med"/>
+            <a:tailEnd type="none" w="med" len="med"/>
+          </a:ln>
+          <a:effectLst/>
+        </p:spPr>
+        <p:txBody>
+          <a:bodyPr vert="horz" wrap="square" lIns="91440" tIns="45720" rIns="91440" bIns="45720" numCol="1" rtlCol="0" anchor="t" anchorCtr="0" compatLnSpc="1">
+            <a:prstTxWarp prst="textNoShape">
+              <a:avLst/>
+            </a:prstTxWarp>
+            <a:noAutofit/>
+          </a:bodyPr>
+          <a:lstStyle/>
+          <a:p>
+            <a:pPr marL="0" marR="0" indent="0" algn="l" defTabSz="914400" rtl="0" eaLnBrk="1" fontAlgn="base" latinLnBrk="0" hangingPunct="1">
+              <a:lnSpc>
+                <a:spcPct val="95000"/>
+              </a:lnSpc>
+              <a:spcBef>
+                <a:spcPct val="0"/>
+              </a:spcBef>
+              <a:spcAft>
+                <a:spcPct val="0"/>
+              </a:spcAft>
+              <a:buClrTx/>
+              <a:buSzTx/>
+              <a:buFont typeface="AU Passata" pitchFamily="34" charset="0"/>
+              <a:buNone/>
+              <a:tabLst/>
+            </a:pPr>
+            <a:endParaRPr kumimoji="0" lang="en-DK" sz="1600" b="0" i="0" u="none" strike="noStrike" cap="none" normalizeH="0" baseline="0" dirty="0" err="1">
+              <a:ln>
+                <a:noFill/>
+              </a:ln>
+              <a:solidFill>
+                <a:schemeClr val="bg1"/>
+              </a:solidFill>
+              <a:effectLst/>
+              <a:latin typeface="AU Passata" pitchFamily="34" charset="0"/>
+            </a:endParaRPr>
+          </a:p>
+        </p:txBody>
+      </p:sp>
+      <p:cxnSp>
+        <p:nvCxnSpPr>
+          <p:cNvPr id="87" name="Straight Connector 86">
+            <a:extLst>
+              <a:ext uri="{FF2B5EF4-FFF2-40B4-BE49-F238E27FC236}">
+                <a16:creationId xmlns:a16="http://schemas.microsoft.com/office/drawing/2014/main" id="{471DE953-8EED-8B46-91FF-247187213406}"/>
+              </a:ext>
+            </a:extLst>
+          </p:cNvPr>
+          <p:cNvCxnSpPr>
+            <a:cxnSpLocks/>
+            <a:stCxn id="86" idx="6"/>
+          </p:cNvCxnSpPr>
+          <p:nvPr/>
+        </p:nvCxnSpPr>
+        <p:spPr bwMode="auto">
+          <a:xfrm flipH="1">
+            <a:off x="7038983" y="3905603"/>
+            <a:ext cx="193654" cy="0"/>
+          </a:xfrm>
+          <a:prstGeom prst="line">
+            <a:avLst/>
+          </a:prstGeom>
+          <a:solidFill>
+            <a:schemeClr val="accent2"/>
+          </a:solidFill>
+          <a:ln w="19050" cap="flat" cmpd="sng" algn="ctr">
+            <a:solidFill>
+              <a:schemeClr val="accent1"/>
+            </a:solidFill>
+            <a:prstDash val="solid"/>
+            <a:round/>
+            <a:headEnd type="none" w="med" len="med"/>
+            <a:tailEnd type="none" w="med" len="med"/>
+          </a:ln>
+          <a:effectLst/>
+        </p:spPr>
+      </p:cxnSp>
+      <p:sp>
+        <p:nvSpPr>
+          <p:cNvPr id="89" name="Cross 88">
+            <a:extLst>
+              <a:ext uri="{FF2B5EF4-FFF2-40B4-BE49-F238E27FC236}">
+                <a16:creationId xmlns:a16="http://schemas.microsoft.com/office/drawing/2014/main" id="{46695391-1C35-BE4F-B91C-07F313CD7A3E}"/>
+              </a:ext>
+            </a:extLst>
+          </p:cNvPr>
+          <p:cNvSpPr>
+            <a:spLocks noChangeAspect="1"/>
+          </p:cNvSpPr>
+          <p:nvPr/>
+        </p:nvSpPr>
+        <p:spPr bwMode="auto">
+          <a:xfrm rot="2700000">
+            <a:off x="6820384" y="3833603"/>
+            <a:ext cx="144000" cy="144000"/>
+          </a:xfrm>
+          <a:prstGeom prst="plus">
+            <a:avLst>
+              <a:gd name="adj" fmla="val 45718"/>
+            </a:avLst>
+          </a:prstGeom>
+          <a:solidFill>
+            <a:schemeClr val="tx1"/>
+          </a:solidFill>
+          <a:ln w="1778" cap="flat" cmpd="sng" algn="ctr">
+            <a:solidFill>
+              <a:schemeClr val="accent1"/>
+            </a:solidFill>
+            <a:prstDash val="solid"/>
+            <a:round/>
+            <a:headEnd type="none" w="med" len="med"/>
+            <a:tailEnd type="none" w="med" len="med"/>
+          </a:ln>
+          <a:effectLst/>
+        </p:spPr>
+        <p:txBody>
+          <a:bodyPr vert="horz" wrap="square" lIns="91440" tIns="45720" rIns="91440" bIns="45720" numCol="1" rtlCol="0" anchor="t" anchorCtr="0" compatLnSpc="1">
+            <a:prstTxWarp prst="textNoShape">
+              <a:avLst/>
+            </a:prstTxWarp>
+            <a:noAutofit/>
+          </a:bodyPr>
+          <a:lstStyle/>
+          <a:p>
+            <a:pPr marL="0" marR="0" indent="0" algn="l" defTabSz="914400" rtl="0" eaLnBrk="1" fontAlgn="base" latinLnBrk="0" hangingPunct="1">
+              <a:lnSpc>
+                <a:spcPct val="95000"/>
+              </a:lnSpc>
+              <a:spcBef>
+                <a:spcPct val="0"/>
+              </a:spcBef>
+              <a:spcAft>
+                <a:spcPct val="0"/>
+              </a:spcAft>
+              <a:buClrTx/>
+              <a:buSzTx/>
+              <a:buFont typeface="AU Passata" pitchFamily="34" charset="0"/>
+              <a:buNone/>
+              <a:tabLst/>
+            </a:pPr>
+            <a:endParaRPr kumimoji="0" lang="en-DK" sz="1600" b="0" i="0" u="none" strike="noStrike" cap="none" normalizeH="0" baseline="0" dirty="0" err="1">
+              <a:ln>
+                <a:noFill/>
+              </a:ln>
+              <a:solidFill>
+                <a:schemeClr val="bg1"/>
+              </a:solidFill>
+              <a:effectLst/>
+              <a:latin typeface="AU Passata" pitchFamily="34" charset="0"/>
+            </a:endParaRPr>
+          </a:p>
+        </p:txBody>
+      </p:sp>
+      <p:cxnSp>
+        <p:nvCxnSpPr>
+          <p:cNvPr id="90" name="Straight Connector 89">
+            <a:extLst>
+              <a:ext uri="{FF2B5EF4-FFF2-40B4-BE49-F238E27FC236}">
+                <a16:creationId xmlns:a16="http://schemas.microsoft.com/office/drawing/2014/main" id="{962B39B1-CE84-074C-BB1B-60A0BD95238E}"/>
+              </a:ext>
+            </a:extLst>
+          </p:cNvPr>
+          <p:cNvCxnSpPr>
+            <a:cxnSpLocks/>
+          </p:cNvCxnSpPr>
+          <p:nvPr/>
+        </p:nvCxnSpPr>
+        <p:spPr bwMode="auto">
+          <a:xfrm>
+            <a:off x="6897421" y="3907129"/>
+            <a:ext cx="144000" cy="0"/>
+          </a:xfrm>
+          <a:prstGeom prst="line">
+            <a:avLst/>
+          </a:prstGeom>
+          <a:solidFill>
+            <a:schemeClr val="accent2"/>
+          </a:solidFill>
+          <a:ln w="19050" cap="flat" cmpd="sng" algn="ctr">
+            <a:solidFill>
+              <a:schemeClr val="accent1"/>
+            </a:solidFill>
+            <a:prstDash val="solid"/>
+            <a:round/>
+            <a:headEnd type="none" w="med" len="med"/>
+            <a:tailEnd type="none" w="med" len="med"/>
+          </a:ln>
+          <a:effectLst/>
+        </p:spPr>
+      </p:cxnSp>
+      <p:sp>
+        <p:nvSpPr>
+          <p:cNvPr id="92" name="Oval 91">
+            <a:extLst>
+              <a:ext uri="{FF2B5EF4-FFF2-40B4-BE49-F238E27FC236}">
+                <a16:creationId xmlns:a16="http://schemas.microsoft.com/office/drawing/2014/main" id="{D493D0F4-AB95-D64F-83F7-31532EE89E59}"/>
+              </a:ext>
+            </a:extLst>
+          </p:cNvPr>
+          <p:cNvSpPr/>
+          <p:nvPr/>
+        </p:nvSpPr>
+        <p:spPr bwMode="auto">
+          <a:xfrm rot="10800000" flipH="1" flipV="1">
+            <a:off x="7169297" y="3631410"/>
+            <a:ext cx="63340" cy="63340"/>
+          </a:xfrm>
+          <a:prstGeom prst="ellipse">
+            <a:avLst/>
+          </a:prstGeom>
+          <a:solidFill>
+            <a:schemeClr val="tx1"/>
+          </a:solidFill>
+          <a:ln w="1778" cap="flat" cmpd="sng" algn="ctr">
+            <a:solidFill>
+              <a:schemeClr val="accent1"/>
+            </a:solidFill>
+            <a:prstDash val="solid"/>
+            <a:round/>
+            <a:headEnd type="none" w="med" len="med"/>
+            <a:tailEnd type="none" w="med" len="med"/>
+          </a:ln>
+          <a:effectLst/>
+        </p:spPr>
+        <p:txBody>
+          <a:bodyPr vert="horz" wrap="square" lIns="91440" tIns="45720" rIns="91440" bIns="45720" numCol="1" rtlCol="0" anchor="t" anchorCtr="0" compatLnSpc="1">
+            <a:prstTxWarp prst="textNoShape">
+              <a:avLst/>
+            </a:prstTxWarp>
+            <a:noAutofit/>
+          </a:bodyPr>
+          <a:lstStyle/>
+          <a:p>
+            <a:pPr marL="0" marR="0" indent="0" algn="l" defTabSz="914400" rtl="0" eaLnBrk="1" fontAlgn="base" latinLnBrk="0" hangingPunct="1">
+              <a:lnSpc>
+                <a:spcPct val="95000"/>
+              </a:lnSpc>
+              <a:spcBef>
+                <a:spcPct val="0"/>
+              </a:spcBef>
+              <a:spcAft>
+                <a:spcPct val="0"/>
+              </a:spcAft>
+              <a:buClrTx/>
+              <a:buSzTx/>
+              <a:buFont typeface="AU Passata" pitchFamily="34" charset="0"/>
+              <a:buNone/>
+              <a:tabLst/>
+            </a:pPr>
+            <a:endParaRPr kumimoji="0" lang="en-DK" sz="1600" b="0" i="0" u="none" strike="noStrike" cap="none" normalizeH="0" baseline="0" dirty="0" err="1">
+              <a:ln>
+                <a:noFill/>
+              </a:ln>
+              <a:solidFill>
+                <a:schemeClr val="bg1"/>
+              </a:solidFill>
+              <a:effectLst/>
+              <a:latin typeface="AU Passata" pitchFamily="34" charset="0"/>
+            </a:endParaRPr>
+          </a:p>
+        </p:txBody>
+      </p:sp>
+      <p:cxnSp>
+        <p:nvCxnSpPr>
+          <p:cNvPr id="93" name="Straight Connector 92">
+            <a:extLst>
+              <a:ext uri="{FF2B5EF4-FFF2-40B4-BE49-F238E27FC236}">
+                <a16:creationId xmlns:a16="http://schemas.microsoft.com/office/drawing/2014/main" id="{5F13BE76-6D3E-EB46-B3E0-11744E34A123}"/>
+              </a:ext>
+            </a:extLst>
+          </p:cNvPr>
+          <p:cNvCxnSpPr>
+            <a:cxnSpLocks/>
+            <a:stCxn id="92" idx="6"/>
+          </p:cNvCxnSpPr>
+          <p:nvPr/>
+        </p:nvCxnSpPr>
+        <p:spPr bwMode="auto">
+          <a:xfrm flipH="1">
+            <a:off x="7038983" y="3663080"/>
+            <a:ext cx="193654" cy="0"/>
+          </a:xfrm>
+          <a:prstGeom prst="line">
+            <a:avLst/>
+          </a:prstGeom>
+          <a:solidFill>
+            <a:schemeClr val="accent2"/>
+          </a:solidFill>
+          <a:ln w="19050" cap="flat" cmpd="sng" algn="ctr">
+            <a:solidFill>
+              <a:schemeClr val="accent1"/>
+            </a:solidFill>
+            <a:prstDash val="solid"/>
+            <a:round/>
+            <a:headEnd type="none" w="med" len="med"/>
+            <a:tailEnd type="none" w="med" len="med"/>
+          </a:ln>
+          <a:effectLst/>
+        </p:spPr>
+      </p:cxnSp>
+      <p:sp>
+        <p:nvSpPr>
+          <p:cNvPr id="95" name="Oval 94">
+            <a:extLst>
+              <a:ext uri="{FF2B5EF4-FFF2-40B4-BE49-F238E27FC236}">
+                <a16:creationId xmlns:a16="http://schemas.microsoft.com/office/drawing/2014/main" id="{6EBE1677-EC89-5945-AC1B-FDE0DC47841D}"/>
+              </a:ext>
+            </a:extLst>
+          </p:cNvPr>
+          <p:cNvSpPr/>
+          <p:nvPr/>
+        </p:nvSpPr>
+        <p:spPr bwMode="auto">
+          <a:xfrm rot="10800000" flipH="1" flipV="1">
+            <a:off x="8082252" y="3934093"/>
+            <a:ext cx="63340" cy="63340"/>
+          </a:xfrm>
+          <a:prstGeom prst="ellipse">
+            <a:avLst/>
+          </a:prstGeom>
+          <a:solidFill>
+            <a:schemeClr val="tx1"/>
+          </a:solidFill>
+          <a:ln w="1778" cap="flat" cmpd="sng" algn="ctr">
+            <a:solidFill>
+              <a:schemeClr val="accent1"/>
+            </a:solidFill>
+            <a:prstDash val="solid"/>
+            <a:round/>
+            <a:headEnd type="none" w="med" len="med"/>
+            <a:tailEnd type="none" w="med" len="med"/>
+          </a:ln>
+          <a:effectLst/>
+        </p:spPr>
+        <p:txBody>
+          <a:bodyPr vert="horz" wrap="square" lIns="91440" tIns="45720" rIns="91440" bIns="45720" numCol="1" rtlCol="0" anchor="t" anchorCtr="0" compatLnSpc="1">
+            <a:prstTxWarp prst="textNoShape">
+              <a:avLst/>
+            </a:prstTxWarp>
+            <a:noAutofit/>
+          </a:bodyPr>
+          <a:lstStyle/>
+          <a:p>
+            <a:pPr marL="0" marR="0" indent="0" algn="l" defTabSz="914400" rtl="0" eaLnBrk="1" fontAlgn="base" latinLnBrk="0" hangingPunct="1">
+              <a:lnSpc>
+                <a:spcPct val="95000"/>
+              </a:lnSpc>
+              <a:spcBef>
+                <a:spcPct val="0"/>
+              </a:spcBef>
+              <a:spcAft>
+                <a:spcPct val="0"/>
+              </a:spcAft>
+              <a:buClrTx/>
+              <a:buSzTx/>
+              <a:buFont typeface="AU Passata" pitchFamily="34" charset="0"/>
+              <a:buNone/>
+              <a:tabLst/>
+            </a:pPr>
+            <a:endParaRPr kumimoji="0" lang="en-DK" sz="1600" b="0" i="0" u="none" strike="noStrike" cap="none" normalizeH="0" baseline="0" dirty="0" err="1">
+              <a:ln>
+                <a:noFill/>
+              </a:ln>
+              <a:solidFill>
+                <a:schemeClr val="bg1"/>
+              </a:solidFill>
+              <a:effectLst/>
+              <a:latin typeface="AU Passata" pitchFamily="34" charset="0"/>
+            </a:endParaRPr>
+          </a:p>
+        </p:txBody>
+      </p:sp>
+      <p:cxnSp>
+        <p:nvCxnSpPr>
+          <p:cNvPr id="96" name="Straight Connector 95">
+            <a:extLst>
+              <a:ext uri="{FF2B5EF4-FFF2-40B4-BE49-F238E27FC236}">
+                <a16:creationId xmlns:a16="http://schemas.microsoft.com/office/drawing/2014/main" id="{6DA2E466-8E6C-C749-A41F-F1A110344749}"/>
+              </a:ext>
+            </a:extLst>
+          </p:cNvPr>
+          <p:cNvCxnSpPr>
+            <a:cxnSpLocks/>
+            <a:stCxn id="95" idx="6"/>
+          </p:cNvCxnSpPr>
+          <p:nvPr/>
+        </p:nvCxnSpPr>
+        <p:spPr bwMode="auto">
+          <a:xfrm flipH="1">
+            <a:off x="7951938" y="3965763"/>
+            <a:ext cx="193654" cy="0"/>
+          </a:xfrm>
+          <a:prstGeom prst="line">
+            <a:avLst/>
+          </a:prstGeom>
+          <a:solidFill>
+            <a:schemeClr val="accent2"/>
+          </a:solidFill>
+          <a:ln w="19050" cap="flat" cmpd="sng" algn="ctr">
+            <a:solidFill>
+              <a:schemeClr val="accent1"/>
+            </a:solidFill>
+            <a:prstDash val="solid"/>
+            <a:round/>
+            <a:headEnd type="none" w="med" len="med"/>
+            <a:tailEnd type="none" w="med" len="med"/>
+          </a:ln>
+          <a:effectLst/>
+        </p:spPr>
+      </p:cxnSp>
+      <p:sp>
+        <p:nvSpPr>
+          <p:cNvPr id="98" name="Cross 97">
+            <a:extLst>
+              <a:ext uri="{FF2B5EF4-FFF2-40B4-BE49-F238E27FC236}">
+                <a16:creationId xmlns:a16="http://schemas.microsoft.com/office/drawing/2014/main" id="{45DB5B56-BEC6-6344-BEC8-AA40AD76597B}"/>
+              </a:ext>
+            </a:extLst>
+          </p:cNvPr>
+          <p:cNvSpPr>
+            <a:spLocks noChangeAspect="1"/>
+          </p:cNvSpPr>
+          <p:nvPr/>
+        </p:nvSpPr>
+        <p:spPr bwMode="auto">
+          <a:xfrm rot="2700000">
+            <a:off x="7731447" y="3717032"/>
+            <a:ext cx="144000" cy="144000"/>
+          </a:xfrm>
+          <a:prstGeom prst="plus">
+            <a:avLst>
+              <a:gd name="adj" fmla="val 45718"/>
+            </a:avLst>
+          </a:prstGeom>
+          <a:solidFill>
+            <a:schemeClr val="tx1"/>
+          </a:solidFill>
+          <a:ln w="1778" cap="flat" cmpd="sng" algn="ctr">
+            <a:solidFill>
+              <a:schemeClr val="accent1"/>
+            </a:solidFill>
+            <a:prstDash val="solid"/>
+            <a:round/>
+            <a:headEnd type="none" w="med" len="med"/>
+            <a:tailEnd type="none" w="med" len="med"/>
+          </a:ln>
+          <a:effectLst/>
+        </p:spPr>
+        <p:txBody>
+          <a:bodyPr vert="horz" wrap="square" lIns="91440" tIns="45720" rIns="91440" bIns="45720" numCol="1" rtlCol="0" anchor="t" anchorCtr="0" compatLnSpc="1">
+            <a:prstTxWarp prst="textNoShape">
+              <a:avLst/>
+            </a:prstTxWarp>
+            <a:noAutofit/>
+          </a:bodyPr>
+          <a:lstStyle/>
+          <a:p>
+            <a:pPr marL="0" marR="0" indent="0" algn="l" defTabSz="914400" rtl="0" eaLnBrk="1" fontAlgn="base" latinLnBrk="0" hangingPunct="1">
+              <a:lnSpc>
+                <a:spcPct val="95000"/>
+              </a:lnSpc>
+              <a:spcBef>
+                <a:spcPct val="0"/>
+              </a:spcBef>
+              <a:spcAft>
+                <a:spcPct val="0"/>
+              </a:spcAft>
+              <a:buClrTx/>
+              <a:buSzTx/>
+              <a:buFont typeface="AU Passata" pitchFamily="34" charset="0"/>
+              <a:buNone/>
+              <a:tabLst/>
+            </a:pPr>
+            <a:endParaRPr kumimoji="0" lang="en-DK" sz="1600" b="0" i="0" u="none" strike="noStrike" cap="none" normalizeH="0" baseline="0" dirty="0" err="1">
+              <a:ln>
+                <a:noFill/>
+              </a:ln>
+              <a:solidFill>
+                <a:schemeClr val="bg1"/>
+              </a:solidFill>
+              <a:effectLst/>
+              <a:latin typeface="AU Passata" pitchFamily="34" charset="0"/>
+            </a:endParaRPr>
+          </a:p>
+        </p:txBody>
+      </p:sp>
+      <p:cxnSp>
+        <p:nvCxnSpPr>
+          <p:cNvPr id="99" name="Straight Connector 98">
+            <a:extLst>
+              <a:ext uri="{FF2B5EF4-FFF2-40B4-BE49-F238E27FC236}">
+                <a16:creationId xmlns:a16="http://schemas.microsoft.com/office/drawing/2014/main" id="{0D03D354-599E-F04A-9349-709794EC0704}"/>
+              </a:ext>
+            </a:extLst>
+          </p:cNvPr>
+          <p:cNvCxnSpPr>
+            <a:cxnSpLocks/>
+          </p:cNvCxnSpPr>
+          <p:nvPr/>
+        </p:nvCxnSpPr>
+        <p:spPr bwMode="auto">
+          <a:xfrm>
+            <a:off x="7808484" y="3790558"/>
+            <a:ext cx="144000" cy="0"/>
+          </a:xfrm>
+          <a:prstGeom prst="line">
+            <a:avLst/>
+          </a:prstGeom>
+          <a:solidFill>
+            <a:schemeClr val="accent2"/>
+          </a:solidFill>
+          <a:ln w="19050" cap="flat" cmpd="sng" algn="ctr">
+            <a:solidFill>
+              <a:schemeClr val="accent1"/>
+            </a:solidFill>
+            <a:prstDash val="solid"/>
+            <a:round/>
+            <a:headEnd type="none" w="med" len="med"/>
+            <a:tailEnd type="none" w="med" len="med"/>
+          </a:ln>
+          <a:effectLst/>
+        </p:spPr>
+      </p:cxnSp>
+      <p:sp>
+        <p:nvSpPr>
+          <p:cNvPr id="101" name="Oval 100">
+            <a:extLst>
+              <a:ext uri="{FF2B5EF4-FFF2-40B4-BE49-F238E27FC236}">
+                <a16:creationId xmlns:a16="http://schemas.microsoft.com/office/drawing/2014/main" id="{71121408-F499-E649-B78E-F804EEADB636}"/>
+              </a:ext>
+            </a:extLst>
+          </p:cNvPr>
+          <p:cNvSpPr/>
+          <p:nvPr/>
+        </p:nvSpPr>
+        <p:spPr bwMode="auto">
+          <a:xfrm rot="10800000" flipH="1" flipV="1">
+            <a:off x="8078981" y="3575710"/>
+            <a:ext cx="63340" cy="63340"/>
+          </a:xfrm>
+          <a:prstGeom prst="ellipse">
+            <a:avLst/>
+          </a:prstGeom>
+          <a:solidFill>
+            <a:schemeClr val="tx1"/>
+          </a:solidFill>
+          <a:ln w="1778" cap="flat" cmpd="sng" algn="ctr">
+            <a:solidFill>
+              <a:schemeClr val="accent1"/>
+            </a:solidFill>
+            <a:prstDash val="solid"/>
+            <a:round/>
+            <a:headEnd type="none" w="med" len="med"/>
+            <a:tailEnd type="none" w="med" len="med"/>
+          </a:ln>
+          <a:effectLst/>
+        </p:spPr>
+        <p:txBody>
+          <a:bodyPr vert="horz" wrap="square" lIns="91440" tIns="45720" rIns="91440" bIns="45720" numCol="1" rtlCol="0" anchor="t" anchorCtr="0" compatLnSpc="1">
+            <a:prstTxWarp prst="textNoShape">
+              <a:avLst/>
+            </a:prstTxWarp>
+            <a:noAutofit/>
+          </a:bodyPr>
+          <a:lstStyle/>
+          <a:p>
+            <a:pPr marL="0" marR="0" indent="0" algn="l" defTabSz="914400" rtl="0" eaLnBrk="1" fontAlgn="base" latinLnBrk="0" hangingPunct="1">
+              <a:lnSpc>
+                <a:spcPct val="95000"/>
+              </a:lnSpc>
+              <a:spcBef>
+                <a:spcPct val="0"/>
+              </a:spcBef>
+              <a:spcAft>
+                <a:spcPct val="0"/>
+              </a:spcAft>
+              <a:buClrTx/>
+              <a:buSzTx/>
+              <a:buFont typeface="AU Passata" pitchFamily="34" charset="0"/>
+              <a:buNone/>
+              <a:tabLst/>
+            </a:pPr>
+            <a:endParaRPr kumimoji="0" lang="en-DK" sz="1600" b="0" i="0" u="none" strike="noStrike" cap="none" normalizeH="0" baseline="0" dirty="0" err="1">
+              <a:ln>
+                <a:noFill/>
+              </a:ln>
+              <a:solidFill>
+                <a:schemeClr val="bg1"/>
+              </a:solidFill>
+              <a:effectLst/>
+              <a:latin typeface="AU Passata" pitchFamily="34" charset="0"/>
+            </a:endParaRPr>
+          </a:p>
+        </p:txBody>
+      </p:sp>
+      <p:cxnSp>
+        <p:nvCxnSpPr>
+          <p:cNvPr id="102" name="Straight Connector 101">
+            <a:extLst>
+              <a:ext uri="{FF2B5EF4-FFF2-40B4-BE49-F238E27FC236}">
+                <a16:creationId xmlns:a16="http://schemas.microsoft.com/office/drawing/2014/main" id="{3DFCCD67-479E-0747-931F-1E04388A0152}"/>
+              </a:ext>
+            </a:extLst>
+          </p:cNvPr>
+          <p:cNvCxnSpPr>
+            <a:cxnSpLocks/>
+            <a:stCxn id="101" idx="6"/>
+          </p:cNvCxnSpPr>
+          <p:nvPr/>
+        </p:nvCxnSpPr>
+        <p:spPr bwMode="auto">
+          <a:xfrm flipH="1">
+            <a:off x="7948667" y="3607380"/>
+            <a:ext cx="193654" cy="0"/>
+          </a:xfrm>
+          <a:prstGeom prst="line">
+            <a:avLst/>
+          </a:prstGeom>
+          <a:solidFill>
+            <a:schemeClr val="accent2"/>
+          </a:solidFill>
+          <a:ln w="19050" cap="flat" cmpd="sng" algn="ctr">
+            <a:solidFill>
+              <a:schemeClr val="accent1"/>
+            </a:solidFill>
+            <a:prstDash val="solid"/>
+            <a:round/>
+            <a:headEnd type="none" w="med" len="med"/>
+            <a:tailEnd type="none" w="med" len="med"/>
+          </a:ln>
+          <a:effectLst/>
+        </p:spPr>
+      </p:cxnSp>
+      <p:sp>
+        <p:nvSpPr>
+          <p:cNvPr id="103" name="Rectangle 102">
+            <a:extLst>
+              <a:ext uri="{FF2B5EF4-FFF2-40B4-BE49-F238E27FC236}">
+                <a16:creationId xmlns:a16="http://schemas.microsoft.com/office/drawing/2014/main" id="{615CFFA8-F4BE-9D44-9F6B-4AA2EF262C2F}"/>
+              </a:ext>
+            </a:extLst>
+          </p:cNvPr>
+          <p:cNvSpPr/>
+          <p:nvPr/>
+        </p:nvSpPr>
+        <p:spPr bwMode="auto">
+          <a:xfrm rot="10800000">
+            <a:off x="4818170" y="3428869"/>
+            <a:ext cx="684575" cy="684575"/>
+          </a:xfrm>
+          <a:prstGeom prst="rect">
+            <a:avLst/>
+          </a:prstGeom>
+          <a:noFill/>
+          <a:ln w="1778" cap="flat" cmpd="sng" algn="ctr">
+            <a:solidFill>
+              <a:schemeClr val="accent1"/>
+            </a:solidFill>
+            <a:prstDash val="solid"/>
+            <a:round/>
+            <a:headEnd type="none" w="med" len="med"/>
+            <a:tailEnd type="none" w="med" len="med"/>
+          </a:ln>
+          <a:effectLst/>
+        </p:spPr>
+        <p:txBody>
+          <a:bodyPr vert="horz" wrap="square" lIns="91440" tIns="45720" rIns="91440" bIns="45720" numCol="1" rtlCol="0" anchor="t" anchorCtr="0" compatLnSpc="1">
+            <a:prstTxWarp prst="textNoShape">
+              <a:avLst/>
+            </a:prstTxWarp>
+            <a:noAutofit/>
+          </a:bodyPr>
+          <a:lstStyle/>
+          <a:p>
+            <a:pPr marL="0" marR="0" indent="0" algn="l" defTabSz="914400" rtl="0" eaLnBrk="1" fontAlgn="base" latinLnBrk="0" hangingPunct="1">
+              <a:lnSpc>
+                <a:spcPct val="95000"/>
+              </a:lnSpc>
+              <a:spcBef>
+                <a:spcPct val="0"/>
+              </a:spcBef>
+              <a:spcAft>
+                <a:spcPct val="0"/>
+              </a:spcAft>
+              <a:buClrTx/>
+              <a:buSzTx/>
+              <a:buFont typeface="AU Passata" pitchFamily="34" charset="0"/>
+              <a:buNone/>
+              <a:tabLst/>
+            </a:pPr>
+            <a:endParaRPr kumimoji="0" lang="en-DK" sz="1600" b="0" i="0" u="none" strike="noStrike" cap="none" normalizeH="0" baseline="0" dirty="0" err="1">
+              <a:ln>
+                <a:noFill/>
+              </a:ln>
+              <a:solidFill>
+                <a:schemeClr val="bg1"/>
+              </a:solidFill>
+              <a:effectLst/>
+              <a:latin typeface="AU Passata" pitchFamily="34" charset="0"/>
+            </a:endParaRPr>
+          </a:p>
+        </p:txBody>
+      </p:sp>
+      <p:sp>
+        <p:nvSpPr>
+          <p:cNvPr id="104" name="Rectangle 103">
+            <a:extLst>
+              <a:ext uri="{FF2B5EF4-FFF2-40B4-BE49-F238E27FC236}">
+                <a16:creationId xmlns:a16="http://schemas.microsoft.com/office/drawing/2014/main" id="{CC61BDDE-92A6-DA4F-A667-E17C100C2B1E}"/>
+              </a:ext>
+            </a:extLst>
+          </p:cNvPr>
+          <p:cNvSpPr/>
+          <p:nvPr/>
+        </p:nvSpPr>
+        <p:spPr bwMode="auto">
+          <a:xfrm rot="10800000">
+            <a:off x="3885380" y="3428869"/>
+            <a:ext cx="684575" cy="684575"/>
+          </a:xfrm>
+          <a:prstGeom prst="rect">
+            <a:avLst/>
+          </a:prstGeom>
+          <a:noFill/>
+          <a:ln w="1778" cap="flat" cmpd="sng" algn="ctr">
+            <a:solidFill>
+              <a:schemeClr val="accent1"/>
+            </a:solidFill>
+            <a:prstDash val="solid"/>
+            <a:round/>
+            <a:headEnd type="none" w="med" len="med"/>
+            <a:tailEnd type="none" w="med" len="med"/>
+          </a:ln>
+          <a:effectLst/>
+        </p:spPr>
+        <p:txBody>
+          <a:bodyPr vert="horz" wrap="square" lIns="91440" tIns="45720" rIns="91440" bIns="45720" numCol="1" rtlCol="0" anchor="t" anchorCtr="0" compatLnSpc="1">
+            <a:prstTxWarp prst="textNoShape">
+              <a:avLst/>
+            </a:prstTxWarp>
+            <a:noAutofit/>
+          </a:bodyPr>
+          <a:lstStyle/>
+          <a:p>
+            <a:pPr marL="0" marR="0" indent="0" algn="l" defTabSz="914400" rtl="0" eaLnBrk="1" fontAlgn="base" latinLnBrk="0" hangingPunct="1">
+              <a:lnSpc>
+                <a:spcPct val="95000"/>
+              </a:lnSpc>
+              <a:spcBef>
+                <a:spcPct val="0"/>
+              </a:spcBef>
+              <a:spcAft>
+                <a:spcPct val="0"/>
+              </a:spcAft>
+              <a:buClrTx/>
+              <a:buSzTx/>
+              <a:buFont typeface="AU Passata" pitchFamily="34" charset="0"/>
+              <a:buNone/>
+              <a:tabLst/>
+            </a:pPr>
+            <a:endParaRPr kumimoji="0" lang="en-DK" sz="1600" b="0" i="0" u="none" strike="noStrike" cap="none" normalizeH="0" baseline="0" dirty="0" err="1">
+              <a:ln>
+                <a:noFill/>
+              </a:ln>
+              <a:solidFill>
+                <a:schemeClr val="bg1"/>
+              </a:solidFill>
+              <a:effectLst/>
+              <a:latin typeface="AU Passata" pitchFamily="34" charset="0"/>
+            </a:endParaRPr>
+          </a:p>
+        </p:txBody>
+      </p:sp>
+      <p:sp>
+        <p:nvSpPr>
+          <p:cNvPr id="106" name="Oval 105">
+            <a:extLst>
+              <a:ext uri="{FF2B5EF4-FFF2-40B4-BE49-F238E27FC236}">
+                <a16:creationId xmlns:a16="http://schemas.microsoft.com/office/drawing/2014/main" id="{EAFB36BF-18FD-D049-9AD7-1F529EDF3461}"/>
+              </a:ext>
+            </a:extLst>
+          </p:cNvPr>
+          <p:cNvSpPr/>
+          <p:nvPr/>
+        </p:nvSpPr>
+        <p:spPr bwMode="auto">
+          <a:xfrm flipH="1" flipV="1">
+            <a:off x="4954523" y="3605040"/>
+            <a:ext cx="63340" cy="63340"/>
+          </a:xfrm>
+          <a:prstGeom prst="ellipse">
+            <a:avLst/>
+          </a:prstGeom>
+          <a:solidFill>
+            <a:schemeClr val="tx1"/>
+          </a:solidFill>
+          <a:ln w="1778" cap="flat" cmpd="sng" algn="ctr">
+            <a:solidFill>
+              <a:schemeClr val="accent1"/>
+            </a:solidFill>
+            <a:prstDash val="solid"/>
+            <a:round/>
+            <a:headEnd type="none" w="med" len="med"/>
+            <a:tailEnd type="none" w="med" len="med"/>
+          </a:ln>
+          <a:effectLst/>
+        </p:spPr>
+        <p:txBody>
+          <a:bodyPr vert="horz" wrap="square" lIns="91440" tIns="45720" rIns="91440" bIns="45720" numCol="1" rtlCol="0" anchor="t" anchorCtr="0" compatLnSpc="1">
+            <a:prstTxWarp prst="textNoShape">
+              <a:avLst/>
+            </a:prstTxWarp>
+            <a:noAutofit/>
+          </a:bodyPr>
+          <a:lstStyle/>
+          <a:p>
+            <a:pPr marL="0" marR="0" indent="0" algn="l" defTabSz="914400" rtl="0" eaLnBrk="1" fontAlgn="base" latinLnBrk="0" hangingPunct="1">
+              <a:lnSpc>
+                <a:spcPct val="95000"/>
+              </a:lnSpc>
+              <a:spcBef>
+                <a:spcPct val="0"/>
+              </a:spcBef>
+              <a:spcAft>
+                <a:spcPct val="0"/>
+              </a:spcAft>
+              <a:buClrTx/>
+              <a:buSzTx/>
+              <a:buFont typeface="AU Passata" pitchFamily="34" charset="0"/>
+              <a:buNone/>
+              <a:tabLst/>
+            </a:pPr>
+            <a:endParaRPr kumimoji="0" lang="en-DK" sz="1600" b="0" i="0" u="none" strike="noStrike" cap="none" normalizeH="0" baseline="0" dirty="0" err="1">
+              <a:ln>
+                <a:noFill/>
+              </a:ln>
+              <a:solidFill>
+                <a:schemeClr val="bg1"/>
+              </a:solidFill>
+              <a:effectLst/>
+              <a:latin typeface="AU Passata" pitchFamily="34" charset="0"/>
+            </a:endParaRPr>
+          </a:p>
+        </p:txBody>
+      </p:sp>
+      <p:cxnSp>
+        <p:nvCxnSpPr>
+          <p:cNvPr id="107" name="Straight Connector 106">
+            <a:extLst>
+              <a:ext uri="{FF2B5EF4-FFF2-40B4-BE49-F238E27FC236}">
+                <a16:creationId xmlns:a16="http://schemas.microsoft.com/office/drawing/2014/main" id="{321330C7-F870-EA43-8341-C8A2C2CB2C3D}"/>
+              </a:ext>
+            </a:extLst>
+          </p:cNvPr>
+          <p:cNvCxnSpPr>
+            <a:cxnSpLocks/>
+            <a:stCxn id="106" idx="6"/>
+          </p:cNvCxnSpPr>
+          <p:nvPr/>
+        </p:nvCxnSpPr>
+        <p:spPr bwMode="auto">
+          <a:xfrm>
+            <a:off x="4954523" y="3636710"/>
+            <a:ext cx="193655" cy="0"/>
+          </a:xfrm>
+          <a:prstGeom prst="line">
+            <a:avLst/>
+          </a:prstGeom>
+          <a:solidFill>
+            <a:schemeClr val="accent2"/>
+          </a:solidFill>
+          <a:ln w="19050" cap="flat" cmpd="sng" algn="ctr">
+            <a:solidFill>
+              <a:schemeClr val="accent1"/>
+            </a:solidFill>
+            <a:prstDash val="solid"/>
+            <a:round/>
+            <a:headEnd type="none" w="med" len="med"/>
+            <a:tailEnd type="none" w="med" len="med"/>
+          </a:ln>
+          <a:effectLst/>
+        </p:spPr>
+      </p:cxnSp>
+      <p:sp>
+        <p:nvSpPr>
+          <p:cNvPr id="109" name="Cross 108">
+            <a:extLst>
+              <a:ext uri="{FF2B5EF4-FFF2-40B4-BE49-F238E27FC236}">
+                <a16:creationId xmlns:a16="http://schemas.microsoft.com/office/drawing/2014/main" id="{E9144DFD-E3E9-8749-AFEF-AD236FEC59AF}"/>
+              </a:ext>
+            </a:extLst>
+          </p:cNvPr>
+          <p:cNvSpPr>
+            <a:spLocks noChangeAspect="1"/>
+          </p:cNvSpPr>
+          <p:nvPr/>
+        </p:nvSpPr>
+        <p:spPr bwMode="auto">
+          <a:xfrm rot="13500000">
+            <a:off x="5222740" y="3808965"/>
+            <a:ext cx="144000" cy="144000"/>
+          </a:xfrm>
+          <a:prstGeom prst="plus">
+            <a:avLst>
+              <a:gd name="adj" fmla="val 45718"/>
+            </a:avLst>
+          </a:prstGeom>
+          <a:solidFill>
+            <a:schemeClr val="tx1"/>
+          </a:solidFill>
+          <a:ln w="1778" cap="flat" cmpd="sng" algn="ctr">
+            <a:solidFill>
+              <a:schemeClr val="accent1"/>
+            </a:solidFill>
+            <a:prstDash val="solid"/>
+            <a:round/>
+            <a:headEnd type="none" w="med" len="med"/>
+            <a:tailEnd type="none" w="med" len="med"/>
+          </a:ln>
+          <a:effectLst/>
+        </p:spPr>
+        <p:txBody>
+          <a:bodyPr vert="horz" wrap="square" lIns="91440" tIns="45720" rIns="91440" bIns="45720" numCol="1" rtlCol="0" anchor="t" anchorCtr="0" compatLnSpc="1">
+            <a:prstTxWarp prst="textNoShape">
+              <a:avLst/>
+            </a:prstTxWarp>
+            <a:noAutofit/>
+          </a:bodyPr>
+          <a:lstStyle/>
+          <a:p>
+            <a:pPr marL="0" marR="0" indent="0" algn="l" defTabSz="914400" rtl="0" eaLnBrk="1" fontAlgn="base" latinLnBrk="0" hangingPunct="1">
+              <a:lnSpc>
+                <a:spcPct val="95000"/>
+              </a:lnSpc>
+              <a:spcBef>
+                <a:spcPct val="0"/>
+              </a:spcBef>
+              <a:spcAft>
+                <a:spcPct val="0"/>
+              </a:spcAft>
+              <a:buClrTx/>
+              <a:buSzTx/>
+              <a:buFont typeface="AU Passata" pitchFamily="34" charset="0"/>
+              <a:buNone/>
+              <a:tabLst/>
+            </a:pPr>
+            <a:endParaRPr kumimoji="0" lang="en-DK" sz="1600" b="0" i="0" u="none" strike="noStrike" cap="none" normalizeH="0" baseline="0" dirty="0" err="1">
+              <a:ln>
+                <a:noFill/>
+              </a:ln>
+              <a:solidFill>
+                <a:schemeClr val="bg1"/>
+              </a:solidFill>
+              <a:effectLst/>
+              <a:latin typeface="AU Passata" pitchFamily="34" charset="0"/>
+            </a:endParaRPr>
+          </a:p>
+        </p:txBody>
+      </p:sp>
+      <p:cxnSp>
+        <p:nvCxnSpPr>
+          <p:cNvPr id="110" name="Straight Connector 109">
+            <a:extLst>
+              <a:ext uri="{FF2B5EF4-FFF2-40B4-BE49-F238E27FC236}">
+                <a16:creationId xmlns:a16="http://schemas.microsoft.com/office/drawing/2014/main" id="{E6EDF7C6-A7A7-FB43-99D6-49DA6DABE927}"/>
+              </a:ext>
+            </a:extLst>
+          </p:cNvPr>
+          <p:cNvCxnSpPr>
+            <a:cxnSpLocks/>
+          </p:cNvCxnSpPr>
+          <p:nvPr/>
+        </p:nvCxnSpPr>
+        <p:spPr bwMode="auto">
+          <a:xfrm rot="10800000">
+            <a:off x="5145703" y="3879439"/>
+            <a:ext cx="144000" cy="0"/>
+          </a:xfrm>
+          <a:prstGeom prst="line">
+            <a:avLst/>
+          </a:prstGeom>
+          <a:solidFill>
+            <a:schemeClr val="accent2"/>
+          </a:solidFill>
+          <a:ln w="19050" cap="flat" cmpd="sng" algn="ctr">
+            <a:solidFill>
+              <a:schemeClr val="accent1"/>
+            </a:solidFill>
+            <a:prstDash val="solid"/>
+            <a:round/>
+            <a:headEnd type="none" w="med" len="med"/>
+            <a:tailEnd type="none" w="med" len="med"/>
+          </a:ln>
+          <a:effectLst/>
+        </p:spPr>
+      </p:cxnSp>
+      <p:sp>
+        <p:nvSpPr>
+          <p:cNvPr id="112" name="Oval 111">
+            <a:extLst>
+              <a:ext uri="{FF2B5EF4-FFF2-40B4-BE49-F238E27FC236}">
+                <a16:creationId xmlns:a16="http://schemas.microsoft.com/office/drawing/2014/main" id="{D83002A0-A6E7-5E4F-B292-C9E0E27AA587}"/>
+              </a:ext>
+            </a:extLst>
+          </p:cNvPr>
+          <p:cNvSpPr/>
+          <p:nvPr/>
+        </p:nvSpPr>
+        <p:spPr bwMode="auto">
+          <a:xfrm flipH="1" flipV="1">
+            <a:off x="4954523" y="3847563"/>
+            <a:ext cx="63340" cy="63340"/>
+          </a:xfrm>
+          <a:prstGeom prst="ellipse">
+            <a:avLst/>
+          </a:prstGeom>
+          <a:solidFill>
+            <a:schemeClr val="tx1"/>
+          </a:solidFill>
+          <a:ln w="1778" cap="flat" cmpd="sng" algn="ctr">
+            <a:solidFill>
+              <a:schemeClr val="accent1"/>
+            </a:solidFill>
+            <a:prstDash val="solid"/>
+            <a:round/>
+            <a:headEnd type="none" w="med" len="med"/>
+            <a:tailEnd type="none" w="med" len="med"/>
+          </a:ln>
+          <a:effectLst/>
+        </p:spPr>
+        <p:txBody>
+          <a:bodyPr vert="horz" wrap="square" lIns="91440" tIns="45720" rIns="91440" bIns="45720" numCol="1" rtlCol="0" anchor="t" anchorCtr="0" compatLnSpc="1">
+            <a:prstTxWarp prst="textNoShape">
+              <a:avLst/>
+            </a:prstTxWarp>
+            <a:noAutofit/>
+          </a:bodyPr>
+          <a:lstStyle/>
+          <a:p>
+            <a:pPr marL="0" marR="0" indent="0" algn="l" defTabSz="914400" rtl="0" eaLnBrk="1" fontAlgn="base" latinLnBrk="0" hangingPunct="1">
+              <a:lnSpc>
+                <a:spcPct val="95000"/>
+              </a:lnSpc>
+              <a:spcBef>
+                <a:spcPct val="0"/>
+              </a:spcBef>
+              <a:spcAft>
+                <a:spcPct val="0"/>
+              </a:spcAft>
+              <a:buClrTx/>
+              <a:buSzTx/>
+              <a:buFont typeface="AU Passata" pitchFamily="34" charset="0"/>
+              <a:buNone/>
+              <a:tabLst/>
+            </a:pPr>
+            <a:endParaRPr kumimoji="0" lang="en-DK" sz="1600" b="0" i="0" u="none" strike="noStrike" cap="none" normalizeH="0" baseline="0" dirty="0" err="1">
+              <a:ln>
+                <a:noFill/>
+              </a:ln>
+              <a:solidFill>
+                <a:schemeClr val="bg1"/>
+              </a:solidFill>
+              <a:effectLst/>
+              <a:latin typeface="AU Passata" pitchFamily="34" charset="0"/>
+            </a:endParaRPr>
+          </a:p>
+        </p:txBody>
+      </p:sp>
+      <p:cxnSp>
+        <p:nvCxnSpPr>
+          <p:cNvPr id="113" name="Straight Connector 112">
+            <a:extLst>
+              <a:ext uri="{FF2B5EF4-FFF2-40B4-BE49-F238E27FC236}">
+                <a16:creationId xmlns:a16="http://schemas.microsoft.com/office/drawing/2014/main" id="{2A9846C4-7E93-7A48-A9C8-FA1EF3673794}"/>
+              </a:ext>
+            </a:extLst>
+          </p:cNvPr>
+          <p:cNvCxnSpPr>
+            <a:cxnSpLocks/>
+            <a:stCxn id="112" idx="6"/>
+          </p:cNvCxnSpPr>
+          <p:nvPr/>
+        </p:nvCxnSpPr>
+        <p:spPr bwMode="auto">
+          <a:xfrm>
+            <a:off x="4954523" y="3879233"/>
+            <a:ext cx="193655" cy="0"/>
+          </a:xfrm>
+          <a:prstGeom prst="line">
+            <a:avLst/>
+          </a:prstGeom>
+          <a:solidFill>
+            <a:schemeClr val="accent2"/>
+          </a:solidFill>
+          <a:ln w="19050" cap="flat" cmpd="sng" algn="ctr">
+            <a:solidFill>
+              <a:schemeClr val="accent1"/>
+            </a:solidFill>
+            <a:prstDash val="solid"/>
+            <a:round/>
+            <a:headEnd type="none" w="med" len="med"/>
+            <a:tailEnd type="none" w="med" len="med"/>
+          </a:ln>
+          <a:effectLst/>
+        </p:spPr>
+      </p:cxnSp>
+      <p:sp>
+        <p:nvSpPr>
+          <p:cNvPr id="115" name="Oval 114">
+            <a:extLst>
+              <a:ext uri="{FF2B5EF4-FFF2-40B4-BE49-F238E27FC236}">
+                <a16:creationId xmlns:a16="http://schemas.microsoft.com/office/drawing/2014/main" id="{8839D736-DBDD-394F-BE07-2BB71D83815E}"/>
+              </a:ext>
+            </a:extLst>
+          </p:cNvPr>
+          <p:cNvSpPr/>
+          <p:nvPr/>
+        </p:nvSpPr>
+        <p:spPr bwMode="auto">
+          <a:xfrm flipH="1" flipV="1">
+            <a:off x="4041568" y="3544880"/>
+            <a:ext cx="63340" cy="63340"/>
+          </a:xfrm>
+          <a:prstGeom prst="ellipse">
+            <a:avLst/>
+          </a:prstGeom>
+          <a:solidFill>
+            <a:schemeClr val="tx1"/>
+          </a:solidFill>
+          <a:ln w="1778" cap="flat" cmpd="sng" algn="ctr">
+            <a:solidFill>
+              <a:schemeClr val="accent1"/>
+            </a:solidFill>
+            <a:prstDash val="solid"/>
+            <a:round/>
+            <a:headEnd type="none" w="med" len="med"/>
+            <a:tailEnd type="none" w="med" len="med"/>
+          </a:ln>
+          <a:effectLst/>
+        </p:spPr>
+        <p:txBody>
+          <a:bodyPr vert="horz" wrap="square" lIns="91440" tIns="45720" rIns="91440" bIns="45720" numCol="1" rtlCol="0" anchor="t" anchorCtr="0" compatLnSpc="1">
+            <a:prstTxWarp prst="textNoShape">
+              <a:avLst/>
+            </a:prstTxWarp>
+            <a:noAutofit/>
+          </a:bodyPr>
+          <a:lstStyle/>
+          <a:p>
+            <a:pPr marL="0" marR="0" indent="0" algn="l" defTabSz="914400" rtl="0" eaLnBrk="1" fontAlgn="base" latinLnBrk="0" hangingPunct="1">
+              <a:lnSpc>
+                <a:spcPct val="95000"/>
+              </a:lnSpc>
+              <a:spcBef>
+                <a:spcPct val="0"/>
+              </a:spcBef>
+              <a:spcAft>
+                <a:spcPct val="0"/>
+              </a:spcAft>
+              <a:buClrTx/>
+              <a:buSzTx/>
+              <a:buFont typeface="AU Passata" pitchFamily="34" charset="0"/>
+              <a:buNone/>
+              <a:tabLst/>
+            </a:pPr>
+            <a:endParaRPr kumimoji="0" lang="en-DK" sz="1600" b="0" i="0" u="none" strike="noStrike" cap="none" normalizeH="0" baseline="0" dirty="0" err="1">
+              <a:ln>
+                <a:noFill/>
+              </a:ln>
+              <a:solidFill>
+                <a:schemeClr val="bg1"/>
+              </a:solidFill>
+              <a:effectLst/>
+              <a:latin typeface="AU Passata" pitchFamily="34" charset="0"/>
+            </a:endParaRPr>
+          </a:p>
+        </p:txBody>
+      </p:sp>
+      <p:cxnSp>
+        <p:nvCxnSpPr>
+          <p:cNvPr id="116" name="Straight Connector 115">
+            <a:extLst>
+              <a:ext uri="{FF2B5EF4-FFF2-40B4-BE49-F238E27FC236}">
+                <a16:creationId xmlns:a16="http://schemas.microsoft.com/office/drawing/2014/main" id="{B45A707C-DC57-364A-B288-0FA33CBAC9F2}"/>
+              </a:ext>
+            </a:extLst>
+          </p:cNvPr>
+          <p:cNvCxnSpPr>
+            <a:cxnSpLocks/>
+            <a:stCxn id="115" idx="6"/>
+          </p:cNvCxnSpPr>
+          <p:nvPr/>
+        </p:nvCxnSpPr>
+        <p:spPr bwMode="auto">
+          <a:xfrm>
+            <a:off x="4041568" y="3576550"/>
+            <a:ext cx="193655" cy="0"/>
+          </a:xfrm>
+          <a:prstGeom prst="line">
+            <a:avLst/>
+          </a:prstGeom>
+          <a:solidFill>
+            <a:schemeClr val="accent2"/>
+          </a:solidFill>
+          <a:ln w="19050" cap="flat" cmpd="sng" algn="ctr">
+            <a:solidFill>
+              <a:schemeClr val="accent1"/>
+            </a:solidFill>
+            <a:prstDash val="solid"/>
+            <a:round/>
+            <a:headEnd type="none" w="med" len="med"/>
+            <a:tailEnd type="none" w="med" len="med"/>
+          </a:ln>
+          <a:effectLst/>
+        </p:spPr>
+      </p:cxnSp>
+      <p:sp>
+        <p:nvSpPr>
+          <p:cNvPr id="118" name="Cross 117">
+            <a:extLst>
+              <a:ext uri="{FF2B5EF4-FFF2-40B4-BE49-F238E27FC236}">
+                <a16:creationId xmlns:a16="http://schemas.microsoft.com/office/drawing/2014/main" id="{D8CF7F8C-6500-8043-8327-0E49923963C9}"/>
+              </a:ext>
+            </a:extLst>
+          </p:cNvPr>
+          <p:cNvSpPr>
+            <a:spLocks noChangeAspect="1"/>
+          </p:cNvSpPr>
+          <p:nvPr/>
+        </p:nvSpPr>
+        <p:spPr bwMode="auto">
+          <a:xfrm rot="13500000">
+            <a:off x="4311713" y="3681281"/>
+            <a:ext cx="144000" cy="144000"/>
+          </a:xfrm>
+          <a:prstGeom prst="plus">
+            <a:avLst>
+              <a:gd name="adj" fmla="val 45718"/>
+            </a:avLst>
+          </a:prstGeom>
+          <a:solidFill>
+            <a:schemeClr val="tx1"/>
+          </a:solidFill>
+          <a:ln w="1778" cap="flat" cmpd="sng" algn="ctr">
+            <a:solidFill>
+              <a:schemeClr val="accent1"/>
+            </a:solidFill>
+            <a:prstDash val="solid"/>
+            <a:round/>
+            <a:headEnd type="none" w="med" len="med"/>
+            <a:tailEnd type="none" w="med" len="med"/>
+          </a:ln>
+          <a:effectLst/>
+        </p:spPr>
+        <p:txBody>
+          <a:bodyPr vert="horz" wrap="square" lIns="91440" tIns="45720" rIns="91440" bIns="45720" numCol="1" rtlCol="0" anchor="t" anchorCtr="0" compatLnSpc="1">
+            <a:prstTxWarp prst="textNoShape">
+              <a:avLst/>
+            </a:prstTxWarp>
+            <a:noAutofit/>
+          </a:bodyPr>
+          <a:lstStyle/>
+          <a:p>
+            <a:pPr marL="0" marR="0" indent="0" algn="l" defTabSz="914400" rtl="0" eaLnBrk="1" fontAlgn="base" latinLnBrk="0" hangingPunct="1">
+              <a:lnSpc>
+                <a:spcPct val="95000"/>
+              </a:lnSpc>
+              <a:spcBef>
+                <a:spcPct val="0"/>
+              </a:spcBef>
+              <a:spcAft>
+                <a:spcPct val="0"/>
+              </a:spcAft>
+              <a:buClrTx/>
+              <a:buSzTx/>
+              <a:buFont typeface="AU Passata" pitchFamily="34" charset="0"/>
+              <a:buNone/>
+              <a:tabLst/>
+            </a:pPr>
+            <a:endParaRPr kumimoji="0" lang="en-DK" sz="1600" b="0" i="0" u="none" strike="noStrike" cap="none" normalizeH="0" baseline="0" dirty="0" err="1">
+              <a:ln>
+                <a:noFill/>
+              </a:ln>
+              <a:solidFill>
+                <a:schemeClr val="bg1"/>
+              </a:solidFill>
+              <a:effectLst/>
+              <a:latin typeface="AU Passata" pitchFamily="34" charset="0"/>
+            </a:endParaRPr>
+          </a:p>
+        </p:txBody>
+      </p:sp>
+      <p:cxnSp>
+        <p:nvCxnSpPr>
+          <p:cNvPr id="119" name="Straight Connector 118">
+            <a:extLst>
+              <a:ext uri="{FF2B5EF4-FFF2-40B4-BE49-F238E27FC236}">
+                <a16:creationId xmlns:a16="http://schemas.microsoft.com/office/drawing/2014/main" id="{195043C0-D569-3E43-884C-B78B8FE600CE}"/>
+              </a:ext>
+            </a:extLst>
+          </p:cNvPr>
+          <p:cNvCxnSpPr>
+            <a:cxnSpLocks/>
+          </p:cNvCxnSpPr>
+          <p:nvPr/>
+        </p:nvCxnSpPr>
+        <p:spPr bwMode="auto">
+          <a:xfrm rot="10800000">
+            <a:off x="4234676" y="3751755"/>
+            <a:ext cx="144000" cy="0"/>
+          </a:xfrm>
+          <a:prstGeom prst="line">
+            <a:avLst/>
+          </a:prstGeom>
+          <a:solidFill>
+            <a:schemeClr val="accent2"/>
+          </a:solidFill>
+          <a:ln w="19050" cap="flat" cmpd="sng" algn="ctr">
+            <a:solidFill>
+              <a:schemeClr val="accent1"/>
+            </a:solidFill>
+            <a:prstDash val="solid"/>
+            <a:round/>
+            <a:headEnd type="none" w="med" len="med"/>
+            <a:tailEnd type="none" w="med" len="med"/>
+          </a:ln>
+          <a:effectLst/>
+        </p:spPr>
+      </p:cxnSp>
+      <p:sp>
+        <p:nvSpPr>
+          <p:cNvPr id="121" name="Oval 120">
+            <a:extLst>
+              <a:ext uri="{FF2B5EF4-FFF2-40B4-BE49-F238E27FC236}">
+                <a16:creationId xmlns:a16="http://schemas.microsoft.com/office/drawing/2014/main" id="{7612D8B8-BD18-4246-B7BC-0B88EADDCE34}"/>
+              </a:ext>
+            </a:extLst>
+          </p:cNvPr>
+          <p:cNvSpPr/>
+          <p:nvPr/>
+        </p:nvSpPr>
+        <p:spPr bwMode="auto">
+          <a:xfrm flipH="1" flipV="1">
+            <a:off x="4044839" y="3903263"/>
+            <a:ext cx="63340" cy="63340"/>
+          </a:xfrm>
+          <a:prstGeom prst="ellipse">
+            <a:avLst/>
+          </a:prstGeom>
+          <a:solidFill>
+            <a:schemeClr val="tx1"/>
+          </a:solidFill>
+          <a:ln w="1778" cap="flat" cmpd="sng" algn="ctr">
+            <a:solidFill>
+              <a:schemeClr val="accent1"/>
+            </a:solidFill>
+            <a:prstDash val="solid"/>
+            <a:round/>
+            <a:headEnd type="none" w="med" len="med"/>
+            <a:tailEnd type="none" w="med" len="med"/>
+          </a:ln>
+          <a:effectLst/>
+        </p:spPr>
+        <p:txBody>
+          <a:bodyPr vert="horz" wrap="square" lIns="91440" tIns="45720" rIns="91440" bIns="45720" numCol="1" rtlCol="0" anchor="t" anchorCtr="0" compatLnSpc="1">
+            <a:prstTxWarp prst="textNoShape">
+              <a:avLst/>
+            </a:prstTxWarp>
+            <a:noAutofit/>
+          </a:bodyPr>
+          <a:lstStyle/>
+          <a:p>
+            <a:pPr marL="0" marR="0" indent="0" algn="l" defTabSz="914400" rtl="0" eaLnBrk="1" fontAlgn="base" latinLnBrk="0" hangingPunct="1">
+              <a:lnSpc>
+                <a:spcPct val="95000"/>
+              </a:lnSpc>
+              <a:spcBef>
+                <a:spcPct val="0"/>
+              </a:spcBef>
+              <a:spcAft>
+                <a:spcPct val="0"/>
+              </a:spcAft>
+              <a:buClrTx/>
+              <a:buSzTx/>
+              <a:buFont typeface="AU Passata" pitchFamily="34" charset="0"/>
+              <a:buNone/>
+              <a:tabLst/>
+            </a:pPr>
+            <a:endParaRPr kumimoji="0" lang="en-DK" sz="1600" b="0" i="0" u="none" strike="noStrike" cap="none" normalizeH="0" baseline="0" dirty="0" err="1">
+              <a:ln>
+                <a:noFill/>
+              </a:ln>
+              <a:solidFill>
+                <a:schemeClr val="bg1"/>
+              </a:solidFill>
+              <a:effectLst/>
+              <a:latin typeface="AU Passata" pitchFamily="34" charset="0"/>
+            </a:endParaRPr>
+          </a:p>
+        </p:txBody>
+      </p:sp>
+      <p:cxnSp>
+        <p:nvCxnSpPr>
+          <p:cNvPr id="122" name="Straight Connector 121">
+            <a:extLst>
+              <a:ext uri="{FF2B5EF4-FFF2-40B4-BE49-F238E27FC236}">
+                <a16:creationId xmlns:a16="http://schemas.microsoft.com/office/drawing/2014/main" id="{F2FFC5EF-77F2-5A43-BC0C-7FFED7E853D6}"/>
+              </a:ext>
+            </a:extLst>
+          </p:cNvPr>
+          <p:cNvCxnSpPr>
+            <a:cxnSpLocks/>
+            <a:stCxn id="121" idx="6"/>
+          </p:cNvCxnSpPr>
+          <p:nvPr/>
+        </p:nvCxnSpPr>
+        <p:spPr bwMode="auto">
+          <a:xfrm>
+            <a:off x="4044839" y="3934933"/>
+            <a:ext cx="193655" cy="0"/>
+          </a:xfrm>
+          <a:prstGeom prst="line">
+            <a:avLst/>
+          </a:prstGeom>
+          <a:solidFill>
+            <a:schemeClr val="accent2"/>
+          </a:solidFill>
+          <a:ln w="19050" cap="flat" cmpd="sng" algn="ctr">
+            <a:solidFill>
+              <a:schemeClr val="accent1"/>
+            </a:solidFill>
+            <a:prstDash val="solid"/>
+            <a:round/>
+            <a:headEnd type="none" w="med" len="med"/>
+            <a:tailEnd type="none" w="med" len="med"/>
+          </a:ln>
+          <a:effectLst/>
+        </p:spPr>
+      </p:cxnSp>
+      <p:sp>
+        <p:nvSpPr>
+          <p:cNvPr id="82" name="Cross 81">
+            <a:extLst>
+              <a:ext uri="{FF2B5EF4-FFF2-40B4-BE49-F238E27FC236}">
+                <a16:creationId xmlns:a16="http://schemas.microsoft.com/office/drawing/2014/main" id="{E88FAAC0-3CDC-3A44-9025-84B3A01E6C1A}"/>
+              </a:ext>
+            </a:extLst>
+          </p:cNvPr>
+          <p:cNvSpPr>
+            <a:spLocks noChangeAspect="1"/>
+          </p:cNvSpPr>
+          <p:nvPr/>
+        </p:nvSpPr>
+        <p:spPr bwMode="auto">
+          <a:xfrm rot="2700000">
+            <a:off x="5877855" y="4590933"/>
+            <a:ext cx="144000" cy="144000"/>
+          </a:xfrm>
+          <a:prstGeom prst="plus">
+            <a:avLst>
+              <a:gd name="adj" fmla="val 45718"/>
+            </a:avLst>
+          </a:prstGeom>
+          <a:solidFill>
+            <a:schemeClr val="tx1"/>
+          </a:solidFill>
+          <a:ln w="1778" cap="flat" cmpd="sng" algn="ctr">
+            <a:solidFill>
+              <a:schemeClr val="accent1"/>
+            </a:solidFill>
+            <a:prstDash val="solid"/>
+            <a:round/>
+            <a:headEnd type="none" w="med" len="med"/>
+            <a:tailEnd type="none" w="med" len="med"/>
+          </a:ln>
+          <a:effectLst/>
+        </p:spPr>
+        <p:txBody>
+          <a:bodyPr vert="horz" wrap="square" lIns="91440" tIns="45720" rIns="91440" bIns="45720" numCol="1" rtlCol="0" anchor="t" anchorCtr="0" compatLnSpc="1">
+            <a:prstTxWarp prst="textNoShape">
+              <a:avLst/>
+            </a:prstTxWarp>
+            <a:noAutofit/>
+          </a:bodyPr>
+          <a:lstStyle/>
+          <a:p>
+            <a:pPr marL="0" marR="0" indent="0" algn="l" defTabSz="914400" rtl="0" eaLnBrk="1" fontAlgn="base" latinLnBrk="0" hangingPunct="1">
+              <a:lnSpc>
+                <a:spcPct val="95000"/>
+              </a:lnSpc>
+              <a:spcBef>
+                <a:spcPct val="0"/>
+              </a:spcBef>
+              <a:spcAft>
+                <a:spcPct val="0"/>
+              </a:spcAft>
+              <a:buClrTx/>
+              <a:buSzTx/>
+              <a:buFont typeface="AU Passata" pitchFamily="34" charset="0"/>
+              <a:buNone/>
+              <a:tabLst/>
+            </a:pPr>
+            <a:endParaRPr kumimoji="0" lang="en-DK" sz="1600" b="0" i="0" u="none" strike="noStrike" cap="none" normalizeH="0" baseline="0" dirty="0" err="1">
+              <a:ln>
+                <a:noFill/>
+              </a:ln>
+              <a:solidFill>
+                <a:schemeClr val="bg1"/>
+              </a:solidFill>
+              <a:effectLst/>
+              <a:latin typeface="AU Passata" pitchFamily="34" charset="0"/>
+            </a:endParaRPr>
+          </a:p>
+        </p:txBody>
+      </p:sp>
+      <p:cxnSp>
+        <p:nvCxnSpPr>
+          <p:cNvPr id="83" name="Straight Connector 82">
+            <a:extLst>
+              <a:ext uri="{FF2B5EF4-FFF2-40B4-BE49-F238E27FC236}">
+                <a16:creationId xmlns:a16="http://schemas.microsoft.com/office/drawing/2014/main" id="{0BD2F3D4-C63F-5744-ADF5-BD5C29A5911E}"/>
+              </a:ext>
+            </a:extLst>
+          </p:cNvPr>
+          <p:cNvCxnSpPr>
+            <a:cxnSpLocks/>
+          </p:cNvCxnSpPr>
+          <p:nvPr/>
+        </p:nvCxnSpPr>
+        <p:spPr bwMode="auto">
+          <a:xfrm>
+            <a:off x="5954892" y="4664459"/>
+            <a:ext cx="144000" cy="0"/>
+          </a:xfrm>
+          <a:prstGeom prst="line">
+            <a:avLst/>
+          </a:prstGeom>
+          <a:solidFill>
+            <a:schemeClr val="accent2"/>
+          </a:solidFill>
+          <a:ln w="19050" cap="flat" cmpd="sng" algn="ctr">
+            <a:solidFill>
+              <a:schemeClr val="accent1"/>
+            </a:solidFill>
+            <a:prstDash val="solid"/>
+            <a:round/>
+            <a:headEnd type="none" w="med" len="med"/>
+            <a:tailEnd type="none" w="med" len="med"/>
+          </a:ln>
+          <a:effectLst/>
+        </p:spPr>
+      </p:cxnSp>
+      <p:sp>
+        <p:nvSpPr>
+          <p:cNvPr id="125" name="Cross 124">
+            <a:extLst>
+              <a:ext uri="{FF2B5EF4-FFF2-40B4-BE49-F238E27FC236}">
+                <a16:creationId xmlns:a16="http://schemas.microsoft.com/office/drawing/2014/main" id="{246D8282-9CE0-F545-927A-A17DF3F60073}"/>
+              </a:ext>
+            </a:extLst>
+          </p:cNvPr>
+          <p:cNvSpPr>
+            <a:spLocks noChangeAspect="1"/>
+          </p:cNvSpPr>
+          <p:nvPr/>
+        </p:nvSpPr>
+        <p:spPr bwMode="auto">
+          <a:xfrm rot="13500000">
+            <a:off x="6173390" y="4595121"/>
+            <a:ext cx="144000" cy="144000"/>
+          </a:xfrm>
+          <a:prstGeom prst="plus">
+            <a:avLst>
+              <a:gd name="adj" fmla="val 45718"/>
+            </a:avLst>
+          </a:prstGeom>
+          <a:solidFill>
+            <a:schemeClr val="tx1"/>
+          </a:solidFill>
+          <a:ln w="1778" cap="flat" cmpd="sng" algn="ctr">
+            <a:solidFill>
+              <a:schemeClr val="accent1"/>
+            </a:solidFill>
+            <a:prstDash val="solid"/>
+            <a:round/>
+            <a:headEnd type="none" w="med" len="med"/>
+            <a:tailEnd type="none" w="med" len="med"/>
+          </a:ln>
+          <a:effectLst/>
+        </p:spPr>
+        <p:txBody>
+          <a:bodyPr vert="horz" wrap="square" lIns="91440" tIns="45720" rIns="91440" bIns="45720" numCol="1" rtlCol="0" anchor="t" anchorCtr="0" compatLnSpc="1">
+            <a:prstTxWarp prst="textNoShape">
+              <a:avLst/>
+            </a:prstTxWarp>
+            <a:noAutofit/>
+          </a:bodyPr>
+          <a:lstStyle/>
+          <a:p>
+            <a:pPr marL="0" marR="0" indent="0" algn="l" defTabSz="914400" rtl="0" eaLnBrk="1" fontAlgn="base" latinLnBrk="0" hangingPunct="1">
+              <a:lnSpc>
+                <a:spcPct val="95000"/>
+              </a:lnSpc>
+              <a:spcBef>
+                <a:spcPct val="0"/>
+              </a:spcBef>
+              <a:spcAft>
+                <a:spcPct val="0"/>
+              </a:spcAft>
+              <a:buClrTx/>
+              <a:buSzTx/>
+              <a:buFont typeface="AU Passata" pitchFamily="34" charset="0"/>
+              <a:buNone/>
+              <a:tabLst/>
+            </a:pPr>
+            <a:endParaRPr kumimoji="0" lang="en-DK" sz="1600" b="0" i="0" u="none" strike="noStrike" cap="none" normalizeH="0" baseline="0" dirty="0" err="1">
+              <a:ln>
+                <a:noFill/>
+              </a:ln>
+              <a:solidFill>
+                <a:schemeClr val="bg1"/>
+              </a:solidFill>
+              <a:effectLst/>
+              <a:latin typeface="AU Passata" pitchFamily="34" charset="0"/>
+            </a:endParaRPr>
+          </a:p>
+        </p:txBody>
+      </p:sp>
+      <p:cxnSp>
+        <p:nvCxnSpPr>
+          <p:cNvPr id="126" name="Straight Connector 125">
+            <a:extLst>
+              <a:ext uri="{FF2B5EF4-FFF2-40B4-BE49-F238E27FC236}">
+                <a16:creationId xmlns:a16="http://schemas.microsoft.com/office/drawing/2014/main" id="{B0C19ED2-93A7-A24C-88D1-20F6D5507B5E}"/>
+              </a:ext>
+            </a:extLst>
+          </p:cNvPr>
+          <p:cNvCxnSpPr>
+            <a:cxnSpLocks/>
+          </p:cNvCxnSpPr>
+          <p:nvPr/>
+        </p:nvCxnSpPr>
+        <p:spPr bwMode="auto">
+          <a:xfrm rot="10800000">
+            <a:off x="6096353" y="4665595"/>
+            <a:ext cx="144000" cy="0"/>
+          </a:xfrm>
+          <a:prstGeom prst="line">
+            <a:avLst/>
+          </a:prstGeom>
+          <a:solidFill>
+            <a:schemeClr val="accent2"/>
+          </a:solidFill>
+          <a:ln w="19050" cap="flat" cmpd="sng" algn="ctr">
+            <a:solidFill>
+              <a:schemeClr val="accent1"/>
+            </a:solidFill>
+            <a:prstDash val="solid"/>
+            <a:round/>
+            <a:headEnd type="none" w="med" len="med"/>
+            <a:tailEnd type="none" w="med" len="med"/>
+          </a:ln>
+          <a:effectLst/>
+        </p:spPr>
+      </p:cxnSp>
+      <p:sp>
+        <p:nvSpPr>
+          <p:cNvPr id="133" name="Cross 132">
+            <a:extLst>
+              <a:ext uri="{FF2B5EF4-FFF2-40B4-BE49-F238E27FC236}">
+                <a16:creationId xmlns:a16="http://schemas.microsoft.com/office/drawing/2014/main" id="{CFD50560-05C5-9A46-B87F-B41489C3C8A4}"/>
+              </a:ext>
+            </a:extLst>
+          </p:cNvPr>
+          <p:cNvSpPr>
+            <a:spLocks noChangeAspect="1"/>
+          </p:cNvSpPr>
+          <p:nvPr/>
+        </p:nvSpPr>
+        <p:spPr bwMode="auto">
+          <a:xfrm rot="2700000">
+            <a:off x="5872842" y="5392529"/>
+            <a:ext cx="144000" cy="144000"/>
+          </a:xfrm>
+          <a:prstGeom prst="plus">
+            <a:avLst>
+              <a:gd name="adj" fmla="val 45718"/>
+            </a:avLst>
+          </a:prstGeom>
+          <a:solidFill>
+            <a:schemeClr val="tx1"/>
+          </a:solidFill>
+          <a:ln w="1778" cap="flat" cmpd="sng" algn="ctr">
+            <a:solidFill>
+              <a:schemeClr val="accent1"/>
+            </a:solidFill>
+            <a:prstDash val="solid"/>
+            <a:round/>
+            <a:headEnd type="none" w="med" len="med"/>
+            <a:tailEnd type="none" w="med" len="med"/>
+          </a:ln>
+          <a:effectLst/>
+        </p:spPr>
+        <p:txBody>
+          <a:bodyPr vert="horz" wrap="square" lIns="91440" tIns="45720" rIns="91440" bIns="45720" numCol="1" rtlCol="0" anchor="t" anchorCtr="0" compatLnSpc="1">
+            <a:prstTxWarp prst="textNoShape">
+              <a:avLst/>
+            </a:prstTxWarp>
+            <a:noAutofit/>
+          </a:bodyPr>
+          <a:lstStyle/>
+          <a:p>
+            <a:pPr marL="0" marR="0" indent="0" algn="l" defTabSz="914400" rtl="0" eaLnBrk="1" fontAlgn="base" latinLnBrk="0" hangingPunct="1">
+              <a:lnSpc>
+                <a:spcPct val="95000"/>
+              </a:lnSpc>
+              <a:spcBef>
+                <a:spcPct val="0"/>
+              </a:spcBef>
+              <a:spcAft>
+                <a:spcPct val="0"/>
+              </a:spcAft>
+              <a:buClrTx/>
+              <a:buSzTx/>
+              <a:buFont typeface="AU Passata" pitchFamily="34" charset="0"/>
+              <a:buNone/>
+              <a:tabLst/>
+            </a:pPr>
+            <a:endParaRPr kumimoji="0" lang="en-DK" sz="1600" b="0" i="0" u="none" strike="noStrike" cap="none" normalizeH="0" baseline="0" dirty="0" err="1">
+              <a:ln>
+                <a:noFill/>
+              </a:ln>
+              <a:solidFill>
+                <a:schemeClr val="bg1"/>
+              </a:solidFill>
+              <a:effectLst/>
+              <a:latin typeface="AU Passata" pitchFamily="34" charset="0"/>
+            </a:endParaRPr>
+          </a:p>
+        </p:txBody>
+      </p:sp>
+      <p:cxnSp>
+        <p:nvCxnSpPr>
+          <p:cNvPr id="134" name="Straight Connector 133">
+            <a:extLst>
+              <a:ext uri="{FF2B5EF4-FFF2-40B4-BE49-F238E27FC236}">
+                <a16:creationId xmlns:a16="http://schemas.microsoft.com/office/drawing/2014/main" id="{D5629657-5705-0D44-BD00-C1B197C12B83}"/>
+              </a:ext>
+            </a:extLst>
+          </p:cNvPr>
+          <p:cNvCxnSpPr>
+            <a:cxnSpLocks/>
+          </p:cNvCxnSpPr>
+          <p:nvPr/>
+        </p:nvCxnSpPr>
+        <p:spPr bwMode="auto">
+          <a:xfrm>
+            <a:off x="5949879" y="5466055"/>
+            <a:ext cx="144000" cy="0"/>
+          </a:xfrm>
+          <a:prstGeom prst="line">
+            <a:avLst/>
+          </a:prstGeom>
+          <a:solidFill>
+            <a:schemeClr val="accent2"/>
+          </a:solidFill>
+          <a:ln w="19050" cap="flat" cmpd="sng" algn="ctr">
+            <a:solidFill>
+              <a:schemeClr val="accent1"/>
+            </a:solidFill>
+            <a:prstDash val="solid"/>
+            <a:round/>
+            <a:headEnd type="none" w="med" len="med"/>
+            <a:tailEnd type="none" w="med" len="med"/>
+          </a:ln>
+          <a:effectLst/>
+        </p:spPr>
+      </p:cxnSp>
+      <p:sp>
+        <p:nvSpPr>
+          <p:cNvPr id="131" name="Cross 130">
+            <a:extLst>
+              <a:ext uri="{FF2B5EF4-FFF2-40B4-BE49-F238E27FC236}">
+                <a16:creationId xmlns:a16="http://schemas.microsoft.com/office/drawing/2014/main" id="{65E041A8-B26D-F846-853D-447E513DC853}"/>
+              </a:ext>
+            </a:extLst>
+          </p:cNvPr>
+          <p:cNvSpPr>
+            <a:spLocks noChangeAspect="1"/>
+          </p:cNvSpPr>
+          <p:nvPr/>
+        </p:nvSpPr>
+        <p:spPr bwMode="auto">
+          <a:xfrm rot="13500000">
+            <a:off x="6175661" y="5609581"/>
+            <a:ext cx="144000" cy="144000"/>
+          </a:xfrm>
+          <a:prstGeom prst="plus">
+            <a:avLst>
+              <a:gd name="adj" fmla="val 45718"/>
+            </a:avLst>
+          </a:prstGeom>
+          <a:solidFill>
+            <a:schemeClr val="tx1"/>
+          </a:solidFill>
+          <a:ln w="1778" cap="flat" cmpd="sng" algn="ctr">
+            <a:solidFill>
+              <a:schemeClr val="accent1"/>
+            </a:solidFill>
+            <a:prstDash val="solid"/>
+            <a:round/>
+            <a:headEnd type="none" w="med" len="med"/>
+            <a:tailEnd type="none" w="med" len="med"/>
+          </a:ln>
+          <a:effectLst/>
+        </p:spPr>
+        <p:txBody>
+          <a:bodyPr vert="horz" wrap="square" lIns="91440" tIns="45720" rIns="91440" bIns="45720" numCol="1" rtlCol="0" anchor="t" anchorCtr="0" compatLnSpc="1">
+            <a:prstTxWarp prst="textNoShape">
+              <a:avLst/>
+            </a:prstTxWarp>
+            <a:noAutofit/>
+          </a:bodyPr>
+          <a:lstStyle/>
+          <a:p>
+            <a:pPr marL="0" marR="0" indent="0" algn="l" defTabSz="914400" rtl="0" eaLnBrk="1" fontAlgn="base" latinLnBrk="0" hangingPunct="1">
+              <a:lnSpc>
+                <a:spcPct val="95000"/>
+              </a:lnSpc>
+              <a:spcBef>
+                <a:spcPct val="0"/>
+              </a:spcBef>
+              <a:spcAft>
+                <a:spcPct val="0"/>
+              </a:spcAft>
+              <a:buClrTx/>
+              <a:buSzTx/>
+              <a:buFont typeface="AU Passata" pitchFamily="34" charset="0"/>
+              <a:buNone/>
+              <a:tabLst/>
+            </a:pPr>
+            <a:endParaRPr kumimoji="0" lang="en-DK" sz="1600" b="0" i="0" u="none" strike="noStrike" cap="none" normalizeH="0" baseline="0" dirty="0" err="1">
+              <a:ln>
+                <a:noFill/>
+              </a:ln>
+              <a:solidFill>
+                <a:schemeClr val="bg1"/>
+              </a:solidFill>
+              <a:effectLst/>
+              <a:latin typeface="AU Passata" pitchFamily="34" charset="0"/>
+            </a:endParaRPr>
+          </a:p>
+        </p:txBody>
+      </p:sp>
+      <p:cxnSp>
+        <p:nvCxnSpPr>
+          <p:cNvPr id="132" name="Straight Connector 131">
+            <a:extLst>
+              <a:ext uri="{FF2B5EF4-FFF2-40B4-BE49-F238E27FC236}">
+                <a16:creationId xmlns:a16="http://schemas.microsoft.com/office/drawing/2014/main" id="{45D85066-236E-EC42-A157-249781553741}"/>
+              </a:ext>
+            </a:extLst>
+          </p:cNvPr>
+          <p:cNvCxnSpPr>
+            <a:cxnSpLocks/>
+          </p:cNvCxnSpPr>
+          <p:nvPr/>
+        </p:nvCxnSpPr>
+        <p:spPr bwMode="auto">
+          <a:xfrm rot="10800000">
+            <a:off x="6098624" y="5680055"/>
+            <a:ext cx="144000" cy="0"/>
+          </a:xfrm>
+          <a:prstGeom prst="line">
+            <a:avLst/>
+          </a:prstGeom>
+          <a:solidFill>
+            <a:schemeClr val="accent2"/>
+          </a:solidFill>
+          <a:ln w="19050" cap="flat" cmpd="sng" algn="ctr">
+            <a:solidFill>
+              <a:schemeClr val="accent1"/>
+            </a:solidFill>
+            <a:prstDash val="solid"/>
+            <a:round/>
+            <a:headEnd type="none" w="med" len="med"/>
+            <a:tailEnd type="none" w="med" len="med"/>
+          </a:ln>
+          <a:effectLst/>
+        </p:spPr>
+      </p:cxnSp>
+      <p:sp>
+        <p:nvSpPr>
+          <p:cNvPr id="240" name="Oval 239">
+            <a:extLst>
+              <a:ext uri="{FF2B5EF4-FFF2-40B4-BE49-F238E27FC236}">
+                <a16:creationId xmlns:a16="http://schemas.microsoft.com/office/drawing/2014/main" id="{37ED73EC-342F-0644-8246-C7EBC43BF2CC}"/>
+              </a:ext>
+            </a:extLst>
+          </p:cNvPr>
+          <p:cNvSpPr/>
+          <p:nvPr/>
+        </p:nvSpPr>
+        <p:spPr bwMode="auto">
+          <a:xfrm rot="10800000" flipH="1" flipV="1">
+            <a:off x="6224260" y="2818703"/>
+            <a:ext cx="63340" cy="63340"/>
+          </a:xfrm>
+          <a:prstGeom prst="ellipse">
+            <a:avLst/>
+          </a:prstGeom>
+          <a:solidFill>
+            <a:schemeClr val="tx1"/>
+          </a:solidFill>
+          <a:ln w="1778" cap="flat" cmpd="sng" algn="ctr">
+            <a:solidFill>
+              <a:schemeClr val="accent1"/>
+            </a:solidFill>
+            <a:prstDash val="solid"/>
+            <a:round/>
+            <a:headEnd type="none" w="med" len="med"/>
+            <a:tailEnd type="none" w="med" len="med"/>
+          </a:ln>
+          <a:effectLst/>
+        </p:spPr>
+        <p:txBody>
+          <a:bodyPr vert="horz" wrap="square" lIns="91440" tIns="45720" rIns="91440" bIns="45720" numCol="1" rtlCol="0" anchor="t" anchorCtr="0" compatLnSpc="1">
+            <a:prstTxWarp prst="textNoShape">
+              <a:avLst/>
+            </a:prstTxWarp>
+            <a:noAutofit/>
+          </a:bodyPr>
+          <a:lstStyle/>
+          <a:p>
+            <a:pPr marL="0" marR="0" indent="0" algn="l" defTabSz="914400" rtl="0" eaLnBrk="1" fontAlgn="base" latinLnBrk="0" hangingPunct="1">
+              <a:lnSpc>
+                <a:spcPct val="95000"/>
+              </a:lnSpc>
+              <a:spcBef>
+                <a:spcPct val="0"/>
+              </a:spcBef>
+              <a:spcAft>
+                <a:spcPct val="0"/>
+              </a:spcAft>
+              <a:buClrTx/>
+              <a:buSzTx/>
+              <a:buFont typeface="AU Passata" pitchFamily="34" charset="0"/>
+              <a:buNone/>
+              <a:tabLst/>
+            </a:pPr>
+            <a:endParaRPr kumimoji="0" lang="en-DK" sz="1600" b="0" i="0" u="none" strike="noStrike" cap="none" normalizeH="0" baseline="0" dirty="0" err="1">
+              <a:ln>
+                <a:noFill/>
+              </a:ln>
+              <a:solidFill>
+                <a:schemeClr val="bg1"/>
+              </a:solidFill>
+              <a:effectLst/>
+              <a:latin typeface="AU Passata" pitchFamily="34" charset="0"/>
+            </a:endParaRPr>
+          </a:p>
+        </p:txBody>
+      </p:sp>
+      <p:cxnSp>
+        <p:nvCxnSpPr>
+          <p:cNvPr id="241" name="Straight Connector 240">
+            <a:extLst>
+              <a:ext uri="{FF2B5EF4-FFF2-40B4-BE49-F238E27FC236}">
+                <a16:creationId xmlns:a16="http://schemas.microsoft.com/office/drawing/2014/main" id="{4FBDF7DD-7FC2-EC4B-9A6C-7C376847D24F}"/>
+              </a:ext>
+            </a:extLst>
+          </p:cNvPr>
+          <p:cNvCxnSpPr>
+            <a:cxnSpLocks/>
+            <a:stCxn id="240" idx="6"/>
+          </p:cNvCxnSpPr>
+          <p:nvPr/>
+        </p:nvCxnSpPr>
+        <p:spPr bwMode="auto">
+          <a:xfrm flipH="1">
+            <a:off x="6093946" y="2850373"/>
+            <a:ext cx="193654" cy="0"/>
+          </a:xfrm>
+          <a:prstGeom prst="line">
+            <a:avLst/>
+          </a:prstGeom>
+          <a:solidFill>
+            <a:schemeClr val="accent2"/>
+          </a:solidFill>
+          <a:ln w="19050" cap="flat" cmpd="sng" algn="ctr">
+            <a:solidFill>
+              <a:schemeClr val="accent1"/>
+            </a:solidFill>
+            <a:prstDash val="solid"/>
+            <a:round/>
+            <a:headEnd type="none" w="med" len="med"/>
+            <a:tailEnd type="none" w="med" len="med"/>
+          </a:ln>
+          <a:effectLst/>
+        </p:spPr>
+      </p:cxnSp>
     </p:spTree>
     <p:custDataLst>
       <p:tags r:id="rId1"/>

</xml_diff>